<commit_message>
Creation of new graphs and new LEfSe analysis
</commit_message>
<xml_diff>
--- a/04_presentations/phages_amps_13062022.pptx
+++ b/04_presentations/phages_amps_13062022.pptx
@@ -10,7 +10,9 @@
     <p:sldId id="258" r:id="rId4"/>
     <p:sldId id="259" r:id="rId5"/>
     <p:sldId id="260" r:id="rId6"/>
-    <p:sldId id="261" r:id="rId7"/>
+    <p:sldId id="263" r:id="rId7"/>
+    <p:sldId id="262" r:id="rId8"/>
+    <p:sldId id="261" r:id="rId9"/>
   </p:sldIdLst>
   <p:sldSz cx="12192000" cy="6858000"/>
   <p:notesSz cx="6858000" cy="9144000"/>
@@ -109,6 +111,11 @@
       </a:defRPr>
     </a:lvl9pPr>
   </p:defaultTextStyle>
+  <p:extLst>
+    <p:ext uri="{EFAFB233-063F-42B5-8137-9DF3F51BA10A}">
+      <p15:sldGuideLst xmlns:p15="http://schemas.microsoft.com/office/powerpoint/2012/main"/>
+    </p:ext>
+  </p:extLst>
 </p:presentation>
 </file>
 
@@ -243,7 +250,7 @@
           <a:p>
             <a:fld id="{B30A7103-B0DC-3E4E-A435-AB5583E17E8E}" type="datetimeFigureOut">
               <a:rPr lang="en-US" smtClean="0"/>
-              <a:t>6/22/22</a:t>
+              <a:t>6/28/22</a:t>
             </a:fld>
             <a:endParaRPr lang="en-US"/>
           </a:p>
@@ -413,7 +420,7 @@
           <a:p>
             <a:fld id="{B30A7103-B0DC-3E4E-A435-AB5583E17E8E}" type="datetimeFigureOut">
               <a:rPr lang="en-US" smtClean="0"/>
-              <a:t>6/22/22</a:t>
+              <a:t>6/28/22</a:t>
             </a:fld>
             <a:endParaRPr lang="en-US"/>
           </a:p>
@@ -593,7 +600,7 @@
           <a:p>
             <a:fld id="{B30A7103-B0DC-3E4E-A435-AB5583E17E8E}" type="datetimeFigureOut">
               <a:rPr lang="en-US" smtClean="0"/>
-              <a:t>6/22/22</a:t>
+              <a:t>6/28/22</a:t>
             </a:fld>
             <a:endParaRPr lang="en-US"/>
           </a:p>
@@ -763,7 +770,7 @@
           <a:p>
             <a:fld id="{B30A7103-B0DC-3E4E-A435-AB5583E17E8E}" type="datetimeFigureOut">
               <a:rPr lang="en-US" smtClean="0"/>
-              <a:t>6/22/22</a:t>
+              <a:t>6/28/22</a:t>
             </a:fld>
             <a:endParaRPr lang="en-US"/>
           </a:p>
@@ -1009,7 +1016,7 @@
           <a:p>
             <a:fld id="{B30A7103-B0DC-3E4E-A435-AB5583E17E8E}" type="datetimeFigureOut">
               <a:rPr lang="en-US" smtClean="0"/>
-              <a:t>6/22/22</a:t>
+              <a:t>6/28/22</a:t>
             </a:fld>
             <a:endParaRPr lang="en-US"/>
           </a:p>
@@ -1241,7 +1248,7 @@
           <a:p>
             <a:fld id="{B30A7103-B0DC-3E4E-A435-AB5583E17E8E}" type="datetimeFigureOut">
               <a:rPr lang="en-US" smtClean="0"/>
-              <a:t>6/22/22</a:t>
+              <a:t>6/28/22</a:t>
             </a:fld>
             <a:endParaRPr lang="en-US"/>
           </a:p>
@@ -1608,7 +1615,7 @@
           <a:p>
             <a:fld id="{B30A7103-B0DC-3E4E-A435-AB5583E17E8E}" type="datetimeFigureOut">
               <a:rPr lang="en-US" smtClean="0"/>
-              <a:t>6/22/22</a:t>
+              <a:t>6/28/22</a:t>
             </a:fld>
             <a:endParaRPr lang="en-US"/>
           </a:p>
@@ -1726,7 +1733,7 @@
           <a:p>
             <a:fld id="{B30A7103-B0DC-3E4E-A435-AB5583E17E8E}" type="datetimeFigureOut">
               <a:rPr lang="en-US" smtClean="0"/>
-              <a:t>6/22/22</a:t>
+              <a:t>6/28/22</a:t>
             </a:fld>
             <a:endParaRPr lang="en-US"/>
           </a:p>
@@ -1821,7 +1828,7 @@
           <a:p>
             <a:fld id="{B30A7103-B0DC-3E4E-A435-AB5583E17E8E}" type="datetimeFigureOut">
               <a:rPr lang="en-US" smtClean="0"/>
-              <a:t>6/22/22</a:t>
+              <a:t>6/28/22</a:t>
             </a:fld>
             <a:endParaRPr lang="en-US"/>
           </a:p>
@@ -2098,7 +2105,7 @@
           <a:p>
             <a:fld id="{B30A7103-B0DC-3E4E-A435-AB5583E17E8E}" type="datetimeFigureOut">
               <a:rPr lang="en-US" smtClean="0"/>
-              <a:t>6/22/22</a:t>
+              <a:t>6/28/22</a:t>
             </a:fld>
             <a:endParaRPr lang="en-US"/>
           </a:p>
@@ -2355,7 +2362,7 @@
           <a:p>
             <a:fld id="{B30A7103-B0DC-3E4E-A435-AB5583E17E8E}" type="datetimeFigureOut">
               <a:rPr lang="en-US" smtClean="0"/>
-              <a:t>6/22/22</a:t>
+              <a:t>6/28/22</a:t>
             </a:fld>
             <a:endParaRPr lang="en-US"/>
           </a:p>
@@ -2568,7 +2575,7 @@
           <a:p>
             <a:fld id="{B30A7103-B0DC-3E4E-A435-AB5583E17E8E}" type="datetimeFigureOut">
               <a:rPr lang="en-US" smtClean="0"/>
-              <a:t>6/22/22</a:t>
+              <a:t>6/28/22</a:t>
             </a:fld>
             <a:endParaRPr lang="en-US"/>
           </a:p>
@@ -3768,7 +3775,7 @@
             <p:ph idx="1"/>
             <p:extLst>
               <p:ext uri="{D42A27DB-BD31-4B8C-83A1-F6EECF244321}">
-                <p14:modId xmlns:p14="http://schemas.microsoft.com/office/powerpoint/2010/main" val="34875683"/>
+                <p14:modId xmlns:p14="http://schemas.microsoft.com/office/powerpoint/2010/main" val="3738500700"/>
               </p:ext>
             </p:extLst>
           </p:nvPr>
@@ -4673,12 +4680,12 @@
                     <a:p>
                       <a:pPr algn="ctr" fontAlgn="b"/>
                       <a:r>
-                        <a:rPr lang="en-MX" sz="1200" u="none" strike="noStrike">
+                        <a:rPr lang="en-MX" sz="1200" u="none" strike="noStrike" dirty="0">
                           <a:effectLst/>
                         </a:rPr>
                         <a:t>222</a:t>
                       </a:r>
-                      <a:endParaRPr lang="en-MX" sz="1200" b="0" i="0" u="none" strike="noStrike">
+                      <a:endParaRPr lang="en-MX" sz="1200" b="0" i="0" u="none" strike="noStrike" dirty="0">
                         <a:solidFill>
                           <a:srgbClr val="000000"/>
                         </a:solidFill>
@@ -4772,12 +4779,12 @@
                     <a:p>
                       <a:pPr algn="ctr" fontAlgn="b"/>
                       <a:r>
-                        <a:rPr lang="en-MX" sz="1200" u="none" strike="noStrike">
+                        <a:rPr lang="en-MX" sz="1200" u="none" strike="noStrike" dirty="0">
                           <a:effectLst/>
                         </a:rPr>
                         <a:t>500</a:t>
                       </a:r>
-                      <a:endParaRPr lang="en-MX" sz="1200" b="0" i="0" u="none" strike="noStrike">
+                      <a:endParaRPr lang="en-MX" sz="1200" b="0" i="0" u="none" strike="noStrike" dirty="0">
                         <a:solidFill>
                           <a:srgbClr val="000000"/>
                         </a:solidFill>
@@ -4802,16 +4809,25 @@
                     <a:p>
                       <a:pPr algn="ctr" fontAlgn="b"/>
                       <a:r>
-                        <a:rPr lang="en-MX" sz="1200" u="none" strike="noStrike">
+                        <a:rPr lang="en-MX" sz="1200" u="none" strike="noStrike" dirty="0">
+                          <a:solidFill>
+                            <a:schemeClr val="bg1"/>
+                          </a:solidFill>
                           <a:effectLst/>
+                          <a:highlight>
+                            <a:srgbClr val="FFFF00"/>
+                          </a:highlight>
                         </a:rPr>
                         <a:t>(0.7, 0.75]</a:t>
                       </a:r>
-                      <a:endParaRPr lang="en-MX" sz="1200" b="0" i="0" u="none" strike="noStrike">
+                      <a:endParaRPr lang="en-MX" sz="1200" b="0" i="0" u="none" strike="noStrike" dirty="0">
                         <a:solidFill>
-                          <a:srgbClr val="000000"/>
+                          <a:schemeClr val="bg1"/>
                         </a:solidFill>
                         <a:effectLst/>
+                        <a:highlight>
+                          <a:srgbClr val="FFFF00"/>
+                        </a:highlight>
                         <a:latin typeface="Calibri" panose="020F0502020204030204" pitchFamily="34" charset="0"/>
                       </a:endParaRPr>
                     </a:p>
@@ -4825,16 +4841,25 @@
                     <a:p>
                       <a:pPr algn="ctr" fontAlgn="b"/>
                       <a:r>
-                        <a:rPr lang="en-MX" sz="1200" u="none" strike="noStrike">
+                        <a:rPr lang="en-MX" sz="1200" u="none" strike="noStrike" dirty="0">
+                          <a:solidFill>
+                            <a:schemeClr val="bg1"/>
+                          </a:solidFill>
                           <a:effectLst/>
+                          <a:highlight>
+                            <a:srgbClr val="FFFF00"/>
+                          </a:highlight>
                         </a:rPr>
                         <a:t>98</a:t>
                       </a:r>
-                      <a:endParaRPr lang="en-MX" sz="1200" b="0" i="0" u="none" strike="noStrike">
+                      <a:endParaRPr lang="en-MX" sz="1200" b="0" i="0" u="none" strike="noStrike" dirty="0">
                         <a:solidFill>
-                          <a:srgbClr val="000000"/>
+                          <a:schemeClr val="bg1"/>
                         </a:solidFill>
                         <a:effectLst/>
+                        <a:highlight>
+                          <a:srgbClr val="FFFF00"/>
+                        </a:highlight>
                         <a:latin typeface="Calibri" panose="020F0502020204030204" pitchFamily="34" charset="0"/>
                       </a:endParaRPr>
                     </a:p>
@@ -4848,18 +4873,18 @@
                     <a:p>
                       <a:pPr algn="ctr" fontAlgn="b"/>
                       <a:r>
-                        <a:rPr lang="en-MX" sz="1200" u="none" strike="noStrike">
+                        <a:rPr lang="en-MX" sz="1200" b="0" i="0" u="none" strike="noStrike" dirty="0">
+                          <a:solidFill>
+                            <a:schemeClr val="bg1"/>
+                          </a:solidFill>
                           <a:effectLst/>
+                          <a:highlight>
+                            <a:srgbClr val="FFFF00"/>
+                          </a:highlight>
+                          <a:latin typeface="Calibri" panose="020F0502020204030204" pitchFamily="34" charset="0"/>
                         </a:rPr>
-                        <a:t>374</a:t>
+                        <a:t>410</a:t>
                       </a:r>
-                      <a:endParaRPr lang="en-MX" sz="1200" b="0" i="0" u="none" strike="noStrike">
-                        <a:solidFill>
-                          <a:srgbClr val="000000"/>
-                        </a:solidFill>
-                        <a:effectLst/>
-                        <a:latin typeface="Calibri" panose="020F0502020204030204" pitchFamily="34" charset="0"/>
-                      </a:endParaRPr>
                     </a:p>
                   </a:txBody>
                   <a:tcPr marL="9525" marR="9525" marT="9525" marB="0" anchor="b"/>
@@ -4879,15 +4904,24 @@
                       <a:pPr algn="ctr" fontAlgn="b"/>
                       <a:r>
                         <a:rPr lang="en-MX" sz="1200" u="none" strike="noStrike">
+                          <a:solidFill>
+                            <a:schemeClr val="bg1"/>
+                          </a:solidFill>
                           <a:effectLst/>
+                          <a:highlight>
+                            <a:srgbClr val="FFFF00"/>
+                          </a:highlight>
                         </a:rPr>
                         <a:t>(0.75, 0.8]</a:t>
                       </a:r>
                       <a:endParaRPr lang="en-MX" sz="1200" b="0" i="0" u="none" strike="noStrike">
                         <a:solidFill>
-                          <a:srgbClr val="000000"/>
+                          <a:schemeClr val="bg1"/>
                         </a:solidFill>
                         <a:effectLst/>
+                        <a:highlight>
+                          <a:srgbClr val="FFFF00"/>
+                        </a:highlight>
                         <a:latin typeface="Calibri" panose="020F0502020204030204" pitchFamily="34" charset="0"/>
                       </a:endParaRPr>
                     </a:p>
@@ -4901,16 +4935,25 @@
                     <a:p>
                       <a:pPr algn="ctr" fontAlgn="b"/>
                       <a:r>
-                        <a:rPr lang="en-MX" sz="1200" u="none" strike="noStrike">
+                        <a:rPr lang="en-MX" sz="1200" u="none" strike="noStrike" dirty="0">
+                          <a:solidFill>
+                            <a:schemeClr val="bg1"/>
+                          </a:solidFill>
                           <a:effectLst/>
+                          <a:highlight>
+                            <a:srgbClr val="FFFF00"/>
+                          </a:highlight>
                         </a:rPr>
                         <a:t>86</a:t>
                       </a:r>
-                      <a:endParaRPr lang="en-MX" sz="1200" b="0" i="0" u="none" strike="noStrike">
+                      <a:endParaRPr lang="en-MX" sz="1200" b="0" i="0" u="none" strike="noStrike" dirty="0">
                         <a:solidFill>
-                          <a:srgbClr val="000000"/>
+                          <a:schemeClr val="bg1"/>
                         </a:solidFill>
                         <a:effectLst/>
+                        <a:highlight>
+                          <a:srgbClr val="FFFF00"/>
+                        </a:highlight>
                         <a:latin typeface="Calibri" panose="020F0502020204030204" pitchFamily="34" charset="0"/>
                       </a:endParaRPr>
                     </a:p>
@@ -4924,16 +4967,25 @@
                     <a:p>
                       <a:pPr algn="ctr" fontAlgn="b"/>
                       <a:r>
-                        <a:rPr lang="en-MX" sz="1200" u="none" strike="noStrike">
+                        <a:rPr lang="en-MX" sz="1200" u="none" strike="noStrike" dirty="0">
+                          <a:solidFill>
+                            <a:schemeClr val="bg1"/>
+                          </a:solidFill>
                           <a:effectLst/>
+                          <a:highlight>
+                            <a:srgbClr val="FFFF00"/>
+                          </a:highlight>
                         </a:rPr>
-                        <a:t>276</a:t>
+                        <a:t>290</a:t>
                       </a:r>
-                      <a:endParaRPr lang="en-MX" sz="1200" b="0" i="0" u="none" strike="noStrike">
+                      <a:endParaRPr lang="en-MX" sz="1200" b="0" i="0" u="none" strike="noStrike" dirty="0">
                         <a:solidFill>
-                          <a:srgbClr val="000000"/>
+                          <a:schemeClr val="bg1"/>
                         </a:solidFill>
                         <a:effectLst/>
+                        <a:highlight>
+                          <a:srgbClr val="FFFF00"/>
+                        </a:highlight>
                         <a:latin typeface="Calibri" panose="020F0502020204030204" pitchFamily="34" charset="0"/>
                       </a:endParaRPr>
                     </a:p>
@@ -5426,10 +5478,10 @@
       </p:pic>
       <p:sp>
         <p:nvSpPr>
-          <p:cNvPr id="8" name="Content Placeholder 2">
+          <p:cNvPr id="6" name="Content Placeholder 2">
             <a:extLst>
               <a:ext uri="{FF2B5EF4-FFF2-40B4-BE49-F238E27FC236}">
-                <a16:creationId xmlns:a16="http://schemas.microsoft.com/office/drawing/2014/main" id="{922712F1-C0B2-71BB-61FD-EAE33AED994C}"/>
+                <a16:creationId xmlns:a16="http://schemas.microsoft.com/office/drawing/2014/main" id="{BBA3336F-09E2-3D95-CC3A-8D3A6D87814B}"/>
               </a:ext>
             </a:extLst>
           </p:cNvPr>
@@ -5449,7 +5501,7 @@
         </p:spPr>
         <p:txBody>
           <a:bodyPr vert="horz" lIns="91440" tIns="45720" rIns="91440" bIns="45720" rtlCol="0" anchor="ctr">
-            <a:normAutofit fontScale="85000" lnSpcReduction="10000"/>
+            <a:normAutofit/>
           </a:bodyPr>
           <a:lstStyle>
             <a:lvl1pPr marL="228600" indent="-228600" algn="l" defTabSz="914400" rtl="0" eaLnBrk="1" latinLnBrk="0" hangingPunct="1">
@@ -5622,7 +5674,31 @@
             </a:pPr>
             <a:r>
               <a:rPr lang="en-US" dirty="0" err="1"/>
-              <a:t>Cada</a:t>
+              <a:t>Cambiar</a:t>
+            </a:r>
+            <a:r>
+              <a:rPr lang="en-US" dirty="0"/>
+              <a:t> a 70% de </a:t>
+            </a:r>
+            <a:r>
+              <a:rPr lang="en-US" dirty="0" err="1"/>
+              <a:t>cobertura</a:t>
+            </a:r>
+            <a:r>
+              <a:rPr lang="en-US" dirty="0"/>
+              <a:t> para </a:t>
+            </a:r>
+            <a:r>
+              <a:rPr lang="en-US" dirty="0" err="1"/>
+              <a:t>considerar</a:t>
+            </a:r>
+            <a:r>
+              <a:rPr lang="en-US" dirty="0"/>
+              <a:t> un </a:t>
+            </a:r>
+            <a:r>
+              <a:rPr lang="en-US" dirty="0" err="1"/>
+              <a:t>fago</a:t>
             </a:r>
             <a:r>
               <a:rPr lang="en-US" dirty="0"/>
@@ -5630,15 +5706,7 @@
             </a:r>
             <a:r>
               <a:rPr lang="en-US" dirty="0" err="1"/>
-              <a:t>muestra</a:t>
-            </a:r>
-            <a:r>
-              <a:rPr lang="en-US" dirty="0"/>
-              <a:t> se </a:t>
-            </a:r>
-            <a:r>
-              <a:rPr lang="en-US" dirty="0" err="1"/>
-              <a:t>alineó</a:t>
+              <a:t>como</a:t>
             </a:r>
             <a:r>
               <a:rPr lang="en-US" dirty="0"/>
@@ -5646,59 +5714,11 @@
             </a:r>
             <a:r>
               <a:rPr lang="en-US" dirty="0" err="1"/>
-              <a:t>por</a:t>
+              <a:t>completo</a:t>
             </a:r>
             <a:r>
               <a:rPr lang="en-US" dirty="0"/>
-              <a:t> </a:t>
-            </a:r>
-            <a:r>
-              <a:rPr lang="en-US" dirty="0" err="1"/>
-              <a:t>separado</a:t>
-            </a:r>
-            <a:r>
-              <a:rPr lang="en-US" dirty="0"/>
-              <a:t> contra </a:t>
-            </a:r>
-            <a:r>
-              <a:rPr lang="en-US" dirty="0" err="1"/>
-              <a:t>los</a:t>
-            </a:r>
-            <a:r>
-              <a:rPr lang="en-US" dirty="0"/>
-              <a:t> </a:t>
-            </a:r>
-            <a:r>
-              <a:rPr lang="en-US" dirty="0" err="1"/>
-              <a:t>fagos</a:t>
-            </a:r>
-            <a:r>
-              <a:rPr lang="en-US" dirty="0"/>
-              <a:t> </a:t>
-            </a:r>
-            <a:r>
-              <a:rPr lang="en-US" dirty="0" err="1"/>
-              <a:t>cubiertos</a:t>
-            </a:r>
-            <a:r>
-              <a:rPr lang="en-US" dirty="0"/>
-              <a:t> </a:t>
-            </a:r>
-            <a:r>
-              <a:rPr lang="en-US" dirty="0" err="1"/>
-              <a:t>en</a:t>
-            </a:r>
-            <a:r>
-              <a:rPr lang="en-US" dirty="0"/>
-              <a:t> </a:t>
-            </a:r>
-            <a:r>
-              <a:rPr lang="en-US" dirty="0" err="1"/>
-              <a:t>más</a:t>
-            </a:r>
-            <a:r>
-              <a:rPr lang="en-US" dirty="0"/>
-              <a:t> del 75%</a:t>
+              <a:t>?</a:t>
             </a:r>
           </a:p>
           <a:p>
@@ -5707,12 +5727,16 @@
               <a:buAutoNum type="arabicPeriod"/>
             </a:pPr>
             <a:r>
+              <a:rPr lang="en-US" dirty="0" err="1"/>
+              <a:t>LEfSe</a:t>
+            </a:r>
+            <a:r>
               <a:rPr lang="en-US" dirty="0"/>
-              <a:t>No se </a:t>
+              <a:t> para </a:t>
             </a:r>
             <a:r>
               <a:rPr lang="en-US" dirty="0" err="1"/>
-              <a:t>tomó</a:t>
+              <a:t>contestar</a:t>
             </a:r>
             <a:r>
               <a:rPr lang="en-US" dirty="0"/>
@@ -5720,7 +5744,7 @@
             </a:r>
             <a:r>
               <a:rPr lang="en-US" dirty="0" err="1"/>
-              <a:t>en</a:t>
+              <a:t>esa</a:t>
             </a:r>
             <a:r>
               <a:rPr lang="en-US" dirty="0"/>
@@ -5728,47 +5752,7 @@
             </a:r>
             <a:r>
               <a:rPr lang="en-US" dirty="0" err="1"/>
-              <a:t>cuenta</a:t>
-            </a:r>
-            <a:r>
-              <a:rPr lang="en-US" dirty="0"/>
-              <a:t> </a:t>
-            </a:r>
-            <a:r>
-              <a:rPr lang="en-US" dirty="0" err="1"/>
-              <a:t>cuánto</a:t>
-            </a:r>
-            <a:r>
-              <a:rPr lang="en-US" dirty="0"/>
-              <a:t> del </a:t>
-            </a:r>
-            <a:r>
-              <a:rPr lang="en-US" dirty="0" err="1"/>
-              <a:t>fago</a:t>
-            </a:r>
-            <a:r>
-              <a:rPr lang="en-US" dirty="0"/>
-              <a:t> se </a:t>
-            </a:r>
-            <a:r>
-              <a:rPr lang="en-US" dirty="0" err="1"/>
-              <a:t>cubría</a:t>
-            </a:r>
-            <a:r>
-              <a:rPr lang="en-US" dirty="0"/>
-              <a:t> </a:t>
-            </a:r>
-            <a:r>
-              <a:rPr lang="en-US" dirty="0" err="1"/>
-              <a:t>por</a:t>
-            </a:r>
-            <a:r>
-              <a:rPr lang="en-US" dirty="0"/>
-              <a:t> </a:t>
-            </a:r>
-            <a:r>
-              <a:rPr lang="en-US" dirty="0" err="1"/>
-              <a:t>muestra</a:t>
+              <a:t>pregunta</a:t>
             </a:r>
             <a:endParaRPr lang="en-US" dirty="0"/>
           </a:p>
@@ -5777,136 +5761,6 @@
               <a:buFont typeface="+mj-lt"/>
               <a:buAutoNum type="arabicPeriod"/>
             </a:pPr>
-            <a:r>
-              <a:rPr lang="en-US" dirty="0"/>
-              <a:t>Falta </a:t>
-            </a:r>
-            <a:r>
-              <a:rPr lang="en-US" dirty="0" err="1"/>
-              <a:t>hacer</a:t>
-            </a:r>
-            <a:r>
-              <a:rPr lang="en-US" dirty="0"/>
-              <a:t> </a:t>
-            </a:r>
-            <a:r>
-              <a:rPr lang="en-US" dirty="0" err="1"/>
-              <a:t>el</a:t>
-            </a:r>
-            <a:r>
-              <a:rPr lang="en-US" dirty="0"/>
-              <a:t> </a:t>
-            </a:r>
-            <a:r>
-              <a:rPr lang="en-US" dirty="0" err="1"/>
-              <a:t>cálculo</a:t>
-            </a:r>
-            <a:r>
-              <a:rPr lang="en-US" dirty="0"/>
-              <a:t> de </a:t>
-            </a:r>
-            <a:r>
-              <a:rPr lang="en-US" dirty="0" err="1"/>
-              <a:t>abundancia</a:t>
-            </a:r>
-            <a:r>
-              <a:rPr lang="en-US" dirty="0"/>
-              <a:t> </a:t>
-            </a:r>
-            <a:r>
-              <a:rPr lang="en-US" dirty="0" err="1"/>
-              <a:t>relativa</a:t>
-            </a:r>
-            <a:r>
-              <a:rPr lang="en-US" dirty="0"/>
-              <a:t> y </a:t>
-            </a:r>
-            <a:r>
-              <a:rPr lang="en-US" dirty="0" err="1"/>
-              <a:t>normalizar</a:t>
-            </a:r>
-            <a:r>
-              <a:rPr lang="en-US" dirty="0"/>
-              <a:t> </a:t>
-            </a:r>
-            <a:r>
-              <a:rPr lang="en-US" dirty="0" err="1"/>
-              <a:t>por</a:t>
-            </a:r>
-            <a:r>
-              <a:rPr lang="en-US" dirty="0"/>
-              <a:t> </a:t>
-            </a:r>
-            <a:r>
-              <a:rPr lang="en-US" dirty="0" err="1"/>
-              <a:t>el</a:t>
-            </a:r>
-            <a:r>
-              <a:rPr lang="en-US" dirty="0"/>
-              <a:t> </a:t>
-            </a:r>
-            <a:r>
-              <a:rPr lang="en-US" dirty="0" err="1"/>
-              <a:t>tamaño</a:t>
-            </a:r>
-            <a:r>
-              <a:rPr lang="en-US" dirty="0"/>
-              <a:t> del </a:t>
-            </a:r>
-            <a:r>
-              <a:rPr lang="en-US" dirty="0" err="1"/>
-              <a:t>fago</a:t>
-            </a:r>
-            <a:r>
-              <a:rPr lang="en-US" dirty="0"/>
-              <a:t>/</a:t>
-            </a:r>
-            <a:r>
-              <a:rPr lang="en-US" dirty="0" err="1"/>
-              <a:t>librería</a:t>
-            </a:r>
-            <a:r>
-              <a:rPr lang="en-US" dirty="0"/>
-              <a:t> (RPKM, FPKM)</a:t>
-            </a:r>
-          </a:p>
-          <a:p>
-            <a:pPr marL="514350" indent="-514350">
-              <a:buFont typeface="+mj-lt"/>
-              <a:buAutoNum type="arabicPeriod"/>
-            </a:pPr>
-            <a:r>
-              <a:rPr lang="en-US" dirty="0"/>
-              <a:t>Falta </a:t>
-            </a:r>
-            <a:r>
-              <a:rPr lang="en-US" dirty="0" err="1"/>
-              <a:t>buscar</a:t>
-            </a:r>
-            <a:r>
-              <a:rPr lang="en-US" dirty="0"/>
-              <a:t> la </a:t>
-            </a:r>
-            <a:r>
-              <a:rPr lang="en-US" dirty="0" err="1"/>
-              <a:t>abundancia</a:t>
-            </a:r>
-            <a:r>
-              <a:rPr lang="en-US" dirty="0"/>
-              <a:t> </a:t>
-            </a:r>
-            <a:r>
-              <a:rPr lang="en-US" dirty="0" err="1"/>
-              <a:t>diferencial</a:t>
-            </a:r>
-            <a:r>
-              <a:rPr lang="en-US" dirty="0"/>
-              <a:t> entre </a:t>
-            </a:r>
-            <a:r>
-              <a:rPr lang="en-US" dirty="0" err="1"/>
-              <a:t>grupos</a:t>
-            </a:r>
             <a:endParaRPr lang="en-US" dirty="0"/>
           </a:p>
         </p:txBody>
@@ -5943,6 +5797,900 @@
       </p:grpSpPr>
       <p:sp>
         <p:nvSpPr>
+          <p:cNvPr id="2" name="Title 1">
+            <a:extLst>
+              <a:ext uri="{FF2B5EF4-FFF2-40B4-BE49-F238E27FC236}">
+                <a16:creationId xmlns:a16="http://schemas.microsoft.com/office/drawing/2014/main" id="{E19511CC-B123-44DF-9D1E-265F7DF5F1BC}"/>
+              </a:ext>
+            </a:extLst>
+          </p:cNvPr>
+          <p:cNvSpPr>
+            <a:spLocks noGrp="1"/>
+          </p:cNvSpPr>
+          <p:nvPr>
+            <p:ph type="title"/>
+          </p:nvPr>
+        </p:nvSpPr>
+        <p:spPr>
+          <a:xfrm>
+            <a:off x="10886" y="1"/>
+            <a:ext cx="12181114" cy="762000"/>
+          </a:xfrm>
+        </p:spPr>
+        <p:txBody>
+          <a:bodyPr>
+            <a:normAutofit/>
+          </a:bodyPr>
+          <a:lstStyle/>
+          <a:p>
+            <a:pPr algn="ctr"/>
+            <a:r>
+              <a:rPr lang="en-US" dirty="0" err="1">
+                <a:solidFill>
+                  <a:schemeClr val="accent1"/>
+                </a:solidFill>
+              </a:rPr>
+              <a:t>Abundancia</a:t>
+            </a:r>
+            <a:r>
+              <a:rPr lang="en-US" dirty="0">
+                <a:solidFill>
+                  <a:schemeClr val="accent1"/>
+                </a:solidFill>
+              </a:rPr>
+              <a:t> </a:t>
+            </a:r>
+            <a:r>
+              <a:rPr lang="en-US" dirty="0" err="1">
+                <a:solidFill>
+                  <a:schemeClr val="accent1"/>
+                </a:solidFill>
+              </a:rPr>
+              <a:t>diferencial</a:t>
+            </a:r>
+            <a:r>
+              <a:rPr lang="en-US" dirty="0">
+                <a:solidFill>
+                  <a:schemeClr val="accent1"/>
+                </a:solidFill>
+              </a:rPr>
+              <a:t> entre </a:t>
+            </a:r>
+            <a:r>
+              <a:rPr lang="en-US" dirty="0" err="1">
+                <a:solidFill>
+                  <a:schemeClr val="accent1"/>
+                </a:solidFill>
+              </a:rPr>
+              <a:t>grupos</a:t>
+            </a:r>
+            <a:endParaRPr lang="en-US" dirty="0">
+              <a:solidFill>
+                <a:schemeClr val="accent1"/>
+              </a:solidFill>
+            </a:endParaRPr>
+          </a:p>
+        </p:txBody>
+      </p:sp>
+      <p:pic>
+        <p:nvPicPr>
+          <p:cNvPr id="12" name="Graphic 11">
+            <a:extLst>
+              <a:ext uri="{FF2B5EF4-FFF2-40B4-BE49-F238E27FC236}">
+                <a16:creationId xmlns:a16="http://schemas.microsoft.com/office/drawing/2014/main" id="{54FB2A0B-A0B8-F4D3-4762-3CDF9E86E554}"/>
+              </a:ext>
+            </a:extLst>
+          </p:cNvPr>
+          <p:cNvPicPr>
+            <a:picLocks noChangeAspect="1"/>
+          </p:cNvPicPr>
+          <p:nvPr/>
+        </p:nvPicPr>
+        <p:blipFill rotWithShape="1">
+          <a:blip r:embed="rId2">
+            <a:extLst>
+              <a:ext uri="{96DAC541-7B7A-43D3-8B79-37D633B846F1}">
+                <asvg:svgBlip xmlns:asvg="http://schemas.microsoft.com/office/drawing/2016/SVG/main" r:embed="rId3"/>
+              </a:ext>
+            </a:extLst>
+          </a:blip>
+          <a:srcRect l="8760" t="16099" r="12398" b="4306"/>
+          <a:stretch/>
+        </p:blipFill>
+        <p:spPr>
+          <a:xfrm>
+            <a:off x="462951" y="928775"/>
+            <a:ext cx="5046454" cy="2941609"/>
+          </a:xfrm>
+          <a:prstGeom prst="rect">
+            <a:avLst/>
+          </a:prstGeom>
+        </p:spPr>
+      </p:pic>
+      <p:pic>
+        <p:nvPicPr>
+          <p:cNvPr id="13" name="Graphic 12">
+            <a:extLst>
+              <a:ext uri="{FF2B5EF4-FFF2-40B4-BE49-F238E27FC236}">
+                <a16:creationId xmlns:a16="http://schemas.microsoft.com/office/drawing/2014/main" id="{8A95C8E1-F9A4-3EAD-B084-BD4091D3139D}"/>
+              </a:ext>
+            </a:extLst>
+          </p:cNvPr>
+          <p:cNvPicPr>
+            <a:picLocks noChangeAspect="1"/>
+          </p:cNvPicPr>
+          <p:nvPr/>
+        </p:nvPicPr>
+        <p:blipFill rotWithShape="1">
+          <a:blip r:embed="rId4">
+            <a:extLst>
+              <a:ext uri="{96DAC541-7B7A-43D3-8B79-37D633B846F1}">
+                <asvg:svgBlip xmlns:asvg="http://schemas.microsoft.com/office/drawing/2016/SVG/main" r:embed="rId5"/>
+              </a:ext>
+            </a:extLst>
+          </a:blip>
+          <a:srcRect l="8604" t="13634" r="11567" b="4437"/>
+          <a:stretch/>
+        </p:blipFill>
+        <p:spPr>
+          <a:xfrm>
+            <a:off x="6998899" y="922904"/>
+            <a:ext cx="4730150" cy="2947480"/>
+          </a:xfrm>
+          <a:prstGeom prst="rect">
+            <a:avLst/>
+          </a:prstGeom>
+        </p:spPr>
+      </p:pic>
+      <p:sp>
+        <p:nvSpPr>
+          <p:cNvPr id="14" name="Content Placeholder 2">
+            <a:extLst>
+              <a:ext uri="{FF2B5EF4-FFF2-40B4-BE49-F238E27FC236}">
+                <a16:creationId xmlns:a16="http://schemas.microsoft.com/office/drawing/2014/main" id="{227E2664-FAF8-7BF6-35DA-5D2982D47F30}"/>
+              </a:ext>
+            </a:extLst>
+          </p:cNvPr>
+          <p:cNvSpPr txBox="1">
+            <a:spLocks/>
+          </p:cNvSpPr>
+          <p:nvPr/>
+        </p:nvSpPr>
+        <p:spPr>
+          <a:xfrm>
+            <a:off x="462951" y="3870384"/>
+            <a:ext cx="5046454" cy="468703"/>
+          </a:xfrm>
+          <a:prstGeom prst="rect">
+            <a:avLst/>
+          </a:prstGeom>
+        </p:spPr>
+        <p:txBody>
+          <a:bodyPr vert="horz" lIns="91440" tIns="45720" rIns="91440" bIns="45720" rtlCol="0" anchor="ctr">
+            <a:normAutofit lnSpcReduction="10000"/>
+          </a:bodyPr>
+          <a:lstStyle>
+            <a:lvl1pPr marL="228600" indent="-228600" algn="l" defTabSz="914400" rtl="0" eaLnBrk="1" latinLnBrk="0" hangingPunct="1">
+              <a:lnSpc>
+                <a:spcPct val="90000"/>
+              </a:lnSpc>
+              <a:spcBef>
+                <a:spcPts val="1000"/>
+              </a:spcBef>
+              <a:buFont typeface="Arial" panose="020B0604020202020204" pitchFamily="34" charset="0"/>
+              <a:buChar char="•"/>
+              <a:defRPr sz="2800" kern="1200">
+                <a:solidFill>
+                  <a:schemeClr val="tx1"/>
+                </a:solidFill>
+                <a:latin typeface="+mn-lt"/>
+                <a:ea typeface="+mn-ea"/>
+                <a:cs typeface="+mn-cs"/>
+              </a:defRPr>
+            </a:lvl1pPr>
+            <a:lvl2pPr marL="685800" indent="-228600" algn="l" defTabSz="914400" rtl="0" eaLnBrk="1" latinLnBrk="0" hangingPunct="1">
+              <a:lnSpc>
+                <a:spcPct val="90000"/>
+              </a:lnSpc>
+              <a:spcBef>
+                <a:spcPts val="500"/>
+              </a:spcBef>
+              <a:buFont typeface="Arial" panose="020B0604020202020204" pitchFamily="34" charset="0"/>
+              <a:buChar char="•"/>
+              <a:defRPr sz="2400" kern="1200">
+                <a:solidFill>
+                  <a:schemeClr val="tx1"/>
+                </a:solidFill>
+                <a:latin typeface="+mn-lt"/>
+                <a:ea typeface="+mn-ea"/>
+                <a:cs typeface="+mn-cs"/>
+              </a:defRPr>
+            </a:lvl2pPr>
+            <a:lvl3pPr marL="1143000" indent="-228600" algn="l" defTabSz="914400" rtl="0" eaLnBrk="1" latinLnBrk="0" hangingPunct="1">
+              <a:lnSpc>
+                <a:spcPct val="90000"/>
+              </a:lnSpc>
+              <a:spcBef>
+                <a:spcPts val="500"/>
+              </a:spcBef>
+              <a:buFont typeface="Arial" panose="020B0604020202020204" pitchFamily="34" charset="0"/>
+              <a:buChar char="•"/>
+              <a:defRPr sz="2000" kern="1200">
+                <a:solidFill>
+                  <a:schemeClr val="tx1"/>
+                </a:solidFill>
+                <a:latin typeface="+mn-lt"/>
+                <a:ea typeface="+mn-ea"/>
+                <a:cs typeface="+mn-cs"/>
+              </a:defRPr>
+            </a:lvl3pPr>
+            <a:lvl4pPr marL="1600200" indent="-228600" algn="l" defTabSz="914400" rtl="0" eaLnBrk="1" latinLnBrk="0" hangingPunct="1">
+              <a:lnSpc>
+                <a:spcPct val="90000"/>
+              </a:lnSpc>
+              <a:spcBef>
+                <a:spcPts val="500"/>
+              </a:spcBef>
+              <a:buFont typeface="Arial" panose="020B0604020202020204" pitchFamily="34" charset="0"/>
+              <a:buChar char="•"/>
+              <a:defRPr sz="1800" kern="1200">
+                <a:solidFill>
+                  <a:schemeClr val="tx1"/>
+                </a:solidFill>
+                <a:latin typeface="+mn-lt"/>
+                <a:ea typeface="+mn-ea"/>
+                <a:cs typeface="+mn-cs"/>
+              </a:defRPr>
+            </a:lvl4pPr>
+            <a:lvl5pPr marL="2057400" indent="-228600" algn="l" defTabSz="914400" rtl="0" eaLnBrk="1" latinLnBrk="0" hangingPunct="1">
+              <a:lnSpc>
+                <a:spcPct val="90000"/>
+              </a:lnSpc>
+              <a:spcBef>
+                <a:spcPts val="500"/>
+              </a:spcBef>
+              <a:buFont typeface="Arial" panose="020B0604020202020204" pitchFamily="34" charset="0"/>
+              <a:buChar char="•"/>
+              <a:defRPr sz="1800" kern="1200">
+                <a:solidFill>
+                  <a:schemeClr val="tx1"/>
+                </a:solidFill>
+                <a:latin typeface="+mn-lt"/>
+                <a:ea typeface="+mn-ea"/>
+                <a:cs typeface="+mn-cs"/>
+              </a:defRPr>
+            </a:lvl5pPr>
+            <a:lvl6pPr marL="2514600" indent="-228600" algn="l" defTabSz="914400" rtl="0" eaLnBrk="1" latinLnBrk="0" hangingPunct="1">
+              <a:lnSpc>
+                <a:spcPct val="90000"/>
+              </a:lnSpc>
+              <a:spcBef>
+                <a:spcPts val="500"/>
+              </a:spcBef>
+              <a:buFont typeface="Arial" panose="020B0604020202020204" pitchFamily="34" charset="0"/>
+              <a:buChar char="•"/>
+              <a:defRPr sz="1800" kern="1200">
+                <a:solidFill>
+                  <a:schemeClr val="tx1"/>
+                </a:solidFill>
+                <a:latin typeface="+mn-lt"/>
+                <a:ea typeface="+mn-ea"/>
+                <a:cs typeface="+mn-cs"/>
+              </a:defRPr>
+            </a:lvl6pPr>
+            <a:lvl7pPr marL="2971800" indent="-228600" algn="l" defTabSz="914400" rtl="0" eaLnBrk="1" latinLnBrk="0" hangingPunct="1">
+              <a:lnSpc>
+                <a:spcPct val="90000"/>
+              </a:lnSpc>
+              <a:spcBef>
+                <a:spcPts val="500"/>
+              </a:spcBef>
+              <a:buFont typeface="Arial" panose="020B0604020202020204" pitchFamily="34" charset="0"/>
+              <a:buChar char="•"/>
+              <a:defRPr sz="1800" kern="1200">
+                <a:solidFill>
+                  <a:schemeClr val="tx1"/>
+                </a:solidFill>
+                <a:latin typeface="+mn-lt"/>
+                <a:ea typeface="+mn-ea"/>
+                <a:cs typeface="+mn-cs"/>
+              </a:defRPr>
+            </a:lvl7pPr>
+            <a:lvl8pPr marL="3429000" indent="-228600" algn="l" defTabSz="914400" rtl="0" eaLnBrk="1" latinLnBrk="0" hangingPunct="1">
+              <a:lnSpc>
+                <a:spcPct val="90000"/>
+              </a:lnSpc>
+              <a:spcBef>
+                <a:spcPts val="500"/>
+              </a:spcBef>
+              <a:buFont typeface="Arial" panose="020B0604020202020204" pitchFamily="34" charset="0"/>
+              <a:buChar char="•"/>
+              <a:defRPr sz="1800" kern="1200">
+                <a:solidFill>
+                  <a:schemeClr val="tx1"/>
+                </a:solidFill>
+                <a:latin typeface="+mn-lt"/>
+                <a:ea typeface="+mn-ea"/>
+                <a:cs typeface="+mn-cs"/>
+              </a:defRPr>
+            </a:lvl8pPr>
+            <a:lvl9pPr marL="3886200" indent="-228600" algn="l" defTabSz="914400" rtl="0" eaLnBrk="1" latinLnBrk="0" hangingPunct="1">
+              <a:lnSpc>
+                <a:spcPct val="90000"/>
+              </a:lnSpc>
+              <a:spcBef>
+                <a:spcPts val="500"/>
+              </a:spcBef>
+              <a:buFont typeface="Arial" panose="020B0604020202020204" pitchFamily="34" charset="0"/>
+              <a:buChar char="•"/>
+              <a:defRPr sz="1800" kern="1200">
+                <a:solidFill>
+                  <a:schemeClr val="tx1"/>
+                </a:solidFill>
+                <a:latin typeface="+mn-lt"/>
+                <a:ea typeface="+mn-ea"/>
+                <a:cs typeface="+mn-cs"/>
+              </a:defRPr>
+            </a:lvl9pPr>
+          </a:lstStyle>
+          <a:p>
+            <a:pPr marL="0" indent="0" algn="ctr">
+              <a:buNone/>
+            </a:pPr>
+            <a:r>
+              <a:rPr lang="en-US" dirty="0"/>
+              <a:t>75% de </a:t>
+            </a:r>
+            <a:r>
+              <a:rPr lang="en-US" dirty="0" err="1"/>
+              <a:t>cobertura</a:t>
+            </a:r>
+            <a:endParaRPr lang="en-US" dirty="0"/>
+          </a:p>
+        </p:txBody>
+      </p:sp>
+      <p:sp>
+        <p:nvSpPr>
+          <p:cNvPr id="15" name="Content Placeholder 2">
+            <a:extLst>
+              <a:ext uri="{FF2B5EF4-FFF2-40B4-BE49-F238E27FC236}">
+                <a16:creationId xmlns:a16="http://schemas.microsoft.com/office/drawing/2014/main" id="{BCBE8559-7729-BE7A-8258-AC667C66C16F}"/>
+              </a:ext>
+            </a:extLst>
+          </p:cNvPr>
+          <p:cNvSpPr txBox="1">
+            <a:spLocks/>
+          </p:cNvSpPr>
+          <p:nvPr/>
+        </p:nvSpPr>
+        <p:spPr>
+          <a:xfrm>
+            <a:off x="6840747" y="3870384"/>
+            <a:ext cx="5046454" cy="468703"/>
+          </a:xfrm>
+          <a:prstGeom prst="rect">
+            <a:avLst/>
+          </a:prstGeom>
+        </p:spPr>
+        <p:txBody>
+          <a:bodyPr vert="horz" lIns="91440" tIns="45720" rIns="91440" bIns="45720" rtlCol="0" anchor="ctr">
+            <a:normAutofit lnSpcReduction="10000"/>
+          </a:bodyPr>
+          <a:lstStyle>
+            <a:lvl1pPr marL="228600" indent="-228600" algn="l" defTabSz="914400" rtl="0" eaLnBrk="1" latinLnBrk="0" hangingPunct="1">
+              <a:lnSpc>
+                <a:spcPct val="90000"/>
+              </a:lnSpc>
+              <a:spcBef>
+                <a:spcPts val="1000"/>
+              </a:spcBef>
+              <a:buFont typeface="Arial" panose="020B0604020202020204" pitchFamily="34" charset="0"/>
+              <a:buChar char="•"/>
+              <a:defRPr sz="2800" kern="1200">
+                <a:solidFill>
+                  <a:schemeClr val="tx1"/>
+                </a:solidFill>
+                <a:latin typeface="+mn-lt"/>
+                <a:ea typeface="+mn-ea"/>
+                <a:cs typeface="+mn-cs"/>
+              </a:defRPr>
+            </a:lvl1pPr>
+            <a:lvl2pPr marL="685800" indent="-228600" algn="l" defTabSz="914400" rtl="0" eaLnBrk="1" latinLnBrk="0" hangingPunct="1">
+              <a:lnSpc>
+                <a:spcPct val="90000"/>
+              </a:lnSpc>
+              <a:spcBef>
+                <a:spcPts val="500"/>
+              </a:spcBef>
+              <a:buFont typeface="Arial" panose="020B0604020202020204" pitchFamily="34" charset="0"/>
+              <a:buChar char="•"/>
+              <a:defRPr sz="2400" kern="1200">
+                <a:solidFill>
+                  <a:schemeClr val="tx1"/>
+                </a:solidFill>
+                <a:latin typeface="+mn-lt"/>
+                <a:ea typeface="+mn-ea"/>
+                <a:cs typeface="+mn-cs"/>
+              </a:defRPr>
+            </a:lvl2pPr>
+            <a:lvl3pPr marL="1143000" indent="-228600" algn="l" defTabSz="914400" rtl="0" eaLnBrk="1" latinLnBrk="0" hangingPunct="1">
+              <a:lnSpc>
+                <a:spcPct val="90000"/>
+              </a:lnSpc>
+              <a:spcBef>
+                <a:spcPts val="500"/>
+              </a:spcBef>
+              <a:buFont typeface="Arial" panose="020B0604020202020204" pitchFamily="34" charset="0"/>
+              <a:buChar char="•"/>
+              <a:defRPr sz="2000" kern="1200">
+                <a:solidFill>
+                  <a:schemeClr val="tx1"/>
+                </a:solidFill>
+                <a:latin typeface="+mn-lt"/>
+                <a:ea typeface="+mn-ea"/>
+                <a:cs typeface="+mn-cs"/>
+              </a:defRPr>
+            </a:lvl3pPr>
+            <a:lvl4pPr marL="1600200" indent="-228600" algn="l" defTabSz="914400" rtl="0" eaLnBrk="1" latinLnBrk="0" hangingPunct="1">
+              <a:lnSpc>
+                <a:spcPct val="90000"/>
+              </a:lnSpc>
+              <a:spcBef>
+                <a:spcPts val="500"/>
+              </a:spcBef>
+              <a:buFont typeface="Arial" panose="020B0604020202020204" pitchFamily="34" charset="0"/>
+              <a:buChar char="•"/>
+              <a:defRPr sz="1800" kern="1200">
+                <a:solidFill>
+                  <a:schemeClr val="tx1"/>
+                </a:solidFill>
+                <a:latin typeface="+mn-lt"/>
+                <a:ea typeface="+mn-ea"/>
+                <a:cs typeface="+mn-cs"/>
+              </a:defRPr>
+            </a:lvl4pPr>
+            <a:lvl5pPr marL="2057400" indent="-228600" algn="l" defTabSz="914400" rtl="0" eaLnBrk="1" latinLnBrk="0" hangingPunct="1">
+              <a:lnSpc>
+                <a:spcPct val="90000"/>
+              </a:lnSpc>
+              <a:spcBef>
+                <a:spcPts val="500"/>
+              </a:spcBef>
+              <a:buFont typeface="Arial" panose="020B0604020202020204" pitchFamily="34" charset="0"/>
+              <a:buChar char="•"/>
+              <a:defRPr sz="1800" kern="1200">
+                <a:solidFill>
+                  <a:schemeClr val="tx1"/>
+                </a:solidFill>
+                <a:latin typeface="+mn-lt"/>
+                <a:ea typeface="+mn-ea"/>
+                <a:cs typeface="+mn-cs"/>
+              </a:defRPr>
+            </a:lvl5pPr>
+            <a:lvl6pPr marL="2514600" indent="-228600" algn="l" defTabSz="914400" rtl="0" eaLnBrk="1" latinLnBrk="0" hangingPunct="1">
+              <a:lnSpc>
+                <a:spcPct val="90000"/>
+              </a:lnSpc>
+              <a:spcBef>
+                <a:spcPts val="500"/>
+              </a:spcBef>
+              <a:buFont typeface="Arial" panose="020B0604020202020204" pitchFamily="34" charset="0"/>
+              <a:buChar char="•"/>
+              <a:defRPr sz="1800" kern="1200">
+                <a:solidFill>
+                  <a:schemeClr val="tx1"/>
+                </a:solidFill>
+                <a:latin typeface="+mn-lt"/>
+                <a:ea typeface="+mn-ea"/>
+                <a:cs typeface="+mn-cs"/>
+              </a:defRPr>
+            </a:lvl6pPr>
+            <a:lvl7pPr marL="2971800" indent="-228600" algn="l" defTabSz="914400" rtl="0" eaLnBrk="1" latinLnBrk="0" hangingPunct="1">
+              <a:lnSpc>
+                <a:spcPct val="90000"/>
+              </a:lnSpc>
+              <a:spcBef>
+                <a:spcPts val="500"/>
+              </a:spcBef>
+              <a:buFont typeface="Arial" panose="020B0604020202020204" pitchFamily="34" charset="0"/>
+              <a:buChar char="•"/>
+              <a:defRPr sz="1800" kern="1200">
+                <a:solidFill>
+                  <a:schemeClr val="tx1"/>
+                </a:solidFill>
+                <a:latin typeface="+mn-lt"/>
+                <a:ea typeface="+mn-ea"/>
+                <a:cs typeface="+mn-cs"/>
+              </a:defRPr>
+            </a:lvl7pPr>
+            <a:lvl8pPr marL="3429000" indent="-228600" algn="l" defTabSz="914400" rtl="0" eaLnBrk="1" latinLnBrk="0" hangingPunct="1">
+              <a:lnSpc>
+                <a:spcPct val="90000"/>
+              </a:lnSpc>
+              <a:spcBef>
+                <a:spcPts val="500"/>
+              </a:spcBef>
+              <a:buFont typeface="Arial" panose="020B0604020202020204" pitchFamily="34" charset="0"/>
+              <a:buChar char="•"/>
+              <a:defRPr sz="1800" kern="1200">
+                <a:solidFill>
+                  <a:schemeClr val="tx1"/>
+                </a:solidFill>
+                <a:latin typeface="+mn-lt"/>
+                <a:ea typeface="+mn-ea"/>
+                <a:cs typeface="+mn-cs"/>
+              </a:defRPr>
+            </a:lvl8pPr>
+            <a:lvl9pPr marL="3886200" indent="-228600" algn="l" defTabSz="914400" rtl="0" eaLnBrk="1" latinLnBrk="0" hangingPunct="1">
+              <a:lnSpc>
+                <a:spcPct val="90000"/>
+              </a:lnSpc>
+              <a:spcBef>
+                <a:spcPts val="500"/>
+              </a:spcBef>
+              <a:buFont typeface="Arial" panose="020B0604020202020204" pitchFamily="34" charset="0"/>
+              <a:buChar char="•"/>
+              <a:defRPr sz="1800" kern="1200">
+                <a:solidFill>
+                  <a:schemeClr val="tx1"/>
+                </a:solidFill>
+                <a:latin typeface="+mn-lt"/>
+                <a:ea typeface="+mn-ea"/>
+                <a:cs typeface="+mn-cs"/>
+              </a:defRPr>
+            </a:lvl9pPr>
+          </a:lstStyle>
+          <a:p>
+            <a:pPr marL="0" indent="0" algn="ctr">
+              <a:buNone/>
+            </a:pPr>
+            <a:r>
+              <a:rPr lang="en-US"/>
+              <a:t>70% </a:t>
+            </a:r>
+            <a:r>
+              <a:rPr lang="en-US" dirty="0"/>
+              <a:t>de </a:t>
+            </a:r>
+            <a:r>
+              <a:rPr lang="en-US" dirty="0" err="1"/>
+              <a:t>cobertura</a:t>
+            </a:r>
+            <a:endParaRPr lang="en-US" dirty="0"/>
+          </a:p>
+        </p:txBody>
+      </p:sp>
+    </p:spTree>
+    <p:extLst>
+      <p:ext uri="{BB962C8B-B14F-4D97-AF65-F5344CB8AC3E}">
+        <p14:creationId xmlns:p14="http://schemas.microsoft.com/office/powerpoint/2010/main" val="1768267032"/>
+      </p:ext>
+    </p:extLst>
+  </p:cSld>
+  <p:clrMapOvr>
+    <a:masterClrMapping/>
+  </p:clrMapOvr>
+</p:sld>
+</file>
+
+<file path=ppt/slides/slide7.xml><?xml version="1.0" encoding="utf-8"?>
+<p:sld xmlns:a="http://schemas.openxmlformats.org/drawingml/2006/main" xmlns:r="http://schemas.openxmlformats.org/officeDocument/2006/relationships" xmlns:p="http://schemas.openxmlformats.org/presentationml/2006/main">
+  <p:cSld>
+    <p:spTree>
+      <p:nvGrpSpPr>
+        <p:cNvPr id="1" name=""/>
+        <p:cNvGrpSpPr/>
+        <p:nvPr/>
+      </p:nvGrpSpPr>
+      <p:grpSpPr>
+        <a:xfrm>
+          <a:off x="0" y="0"/>
+          <a:ext cx="0" cy="0"/>
+          <a:chOff x="0" y="0"/>
+          <a:chExt cx="0" cy="0"/>
+        </a:xfrm>
+      </p:grpSpPr>
+      <p:sp>
+        <p:nvSpPr>
+          <p:cNvPr id="2" name="Title 1">
+            <a:extLst>
+              <a:ext uri="{FF2B5EF4-FFF2-40B4-BE49-F238E27FC236}">
+                <a16:creationId xmlns:a16="http://schemas.microsoft.com/office/drawing/2014/main" id="{E19511CC-B123-44DF-9D1E-265F7DF5F1BC}"/>
+              </a:ext>
+            </a:extLst>
+          </p:cNvPr>
+          <p:cNvSpPr>
+            <a:spLocks noGrp="1"/>
+          </p:cNvSpPr>
+          <p:nvPr>
+            <p:ph type="title"/>
+          </p:nvPr>
+        </p:nvSpPr>
+        <p:spPr>
+          <a:xfrm>
+            <a:off x="10886" y="1"/>
+            <a:ext cx="12181114" cy="762000"/>
+          </a:xfrm>
+        </p:spPr>
+        <p:txBody>
+          <a:bodyPr>
+            <a:normAutofit fontScale="90000"/>
+          </a:bodyPr>
+          <a:lstStyle/>
+          <a:p>
+            <a:pPr algn="ctr"/>
+            <a:r>
+              <a:rPr lang="en-US" dirty="0" err="1">
+                <a:solidFill>
+                  <a:schemeClr val="accent1"/>
+                </a:solidFill>
+              </a:rPr>
+              <a:t>Realineamiento</a:t>
+            </a:r>
+            <a:r>
+              <a:rPr lang="en-US" dirty="0">
+                <a:solidFill>
+                  <a:schemeClr val="accent1"/>
+                </a:solidFill>
+              </a:rPr>
+              <a:t> </a:t>
+            </a:r>
+            <a:r>
+              <a:rPr lang="en-US" dirty="0" err="1">
+                <a:solidFill>
+                  <a:schemeClr val="accent1"/>
+                </a:solidFill>
+              </a:rPr>
+              <a:t>por</a:t>
+            </a:r>
+            <a:r>
+              <a:rPr lang="en-US" dirty="0">
+                <a:solidFill>
+                  <a:schemeClr val="accent1"/>
+                </a:solidFill>
+              </a:rPr>
+              <a:t> </a:t>
+            </a:r>
+            <a:r>
+              <a:rPr lang="en-US" dirty="0" err="1">
+                <a:solidFill>
+                  <a:schemeClr val="accent1"/>
+                </a:solidFill>
+              </a:rPr>
+              <a:t>muestra</a:t>
+            </a:r>
+            <a:r>
+              <a:rPr lang="en-US" dirty="0">
+                <a:solidFill>
+                  <a:schemeClr val="accent1"/>
+                </a:solidFill>
+              </a:rPr>
+              <a:t>, </a:t>
+            </a:r>
+            <a:r>
+              <a:rPr lang="en-US" dirty="0" err="1">
+                <a:solidFill>
+                  <a:schemeClr val="accent1"/>
+                </a:solidFill>
+              </a:rPr>
+              <a:t>abundancia</a:t>
+            </a:r>
+            <a:r>
+              <a:rPr lang="en-US" dirty="0">
+                <a:solidFill>
+                  <a:schemeClr val="accent1"/>
+                </a:solidFill>
+              </a:rPr>
+              <a:t> </a:t>
+            </a:r>
+            <a:r>
+              <a:rPr lang="en-US" dirty="0" err="1">
+                <a:solidFill>
+                  <a:schemeClr val="accent1"/>
+                </a:solidFill>
+              </a:rPr>
+              <a:t>relativa</a:t>
+            </a:r>
+            <a:r>
+              <a:rPr lang="en-US" dirty="0">
+                <a:solidFill>
+                  <a:schemeClr val="accent1"/>
+                </a:solidFill>
+              </a:rPr>
+              <a:t> y RPKM</a:t>
+            </a:r>
+          </a:p>
+        </p:txBody>
+      </p:sp>
+      <p:sp>
+        <p:nvSpPr>
+          <p:cNvPr id="8" name="Rectangle 7">
+            <a:extLst>
+              <a:ext uri="{FF2B5EF4-FFF2-40B4-BE49-F238E27FC236}">
+                <a16:creationId xmlns:a16="http://schemas.microsoft.com/office/drawing/2014/main" id="{2787D638-3032-E1CC-E751-36D6043A96DA}"/>
+              </a:ext>
+            </a:extLst>
+          </p:cNvPr>
+          <p:cNvSpPr/>
+          <p:nvPr/>
+        </p:nvSpPr>
+        <p:spPr>
+          <a:xfrm>
+            <a:off x="393035" y="762001"/>
+            <a:ext cx="4949303" cy="3444787"/>
+          </a:xfrm>
+          <a:prstGeom prst="rect">
+            <a:avLst/>
+          </a:prstGeom>
+        </p:spPr>
+        <p:style>
+          <a:lnRef idx="2">
+            <a:schemeClr val="accent6"/>
+          </a:lnRef>
+          <a:fillRef idx="1">
+            <a:schemeClr val="lt1"/>
+          </a:fillRef>
+          <a:effectRef idx="0">
+            <a:schemeClr val="accent6"/>
+          </a:effectRef>
+          <a:fontRef idx="minor">
+            <a:schemeClr val="dk1"/>
+          </a:fontRef>
+        </p:style>
+        <p:txBody>
+          <a:bodyPr rtlCol="0" anchor="ctr"/>
+          <a:lstStyle/>
+          <a:p>
+            <a:pPr algn="ctr"/>
+            <a:endParaRPr lang="en-US"/>
+          </a:p>
+        </p:txBody>
+      </p:sp>
+      <p:pic>
+        <p:nvPicPr>
+          <p:cNvPr id="7" name="Content Placeholder 6">
+            <a:extLst>
+              <a:ext uri="{FF2B5EF4-FFF2-40B4-BE49-F238E27FC236}">
+                <a16:creationId xmlns:a16="http://schemas.microsoft.com/office/drawing/2014/main" id="{6E93F1BA-1798-DF7A-57FA-2E299383A6A5}"/>
+              </a:ext>
+            </a:extLst>
+          </p:cNvPr>
+          <p:cNvPicPr>
+            <a:picLocks noGrp="1" noChangeAspect="1"/>
+          </p:cNvPicPr>
+          <p:nvPr>
+            <p:ph idx="1"/>
+          </p:nvPr>
+        </p:nvPicPr>
+        <p:blipFill>
+          <a:blip r:embed="rId2">
+            <a:extLst>
+              <a:ext uri="{96DAC541-7B7A-43D3-8B79-37D633B846F1}">
+                <asvg:svgBlip xmlns:asvg="http://schemas.microsoft.com/office/drawing/2016/SVG/main" r:embed="rId3"/>
+              </a:ext>
+            </a:extLst>
+          </a:blip>
+          <a:srcRect l="2108" r="2108"/>
+          <a:stretch/>
+        </p:blipFill>
+        <p:spPr>
+          <a:xfrm>
+            <a:off x="393035" y="762001"/>
+            <a:ext cx="4949303" cy="3444787"/>
+          </a:xfrm>
+        </p:spPr>
+      </p:pic>
+      <p:sp>
+        <p:nvSpPr>
+          <p:cNvPr id="9" name="Rectangle 8">
+            <a:extLst>
+              <a:ext uri="{FF2B5EF4-FFF2-40B4-BE49-F238E27FC236}">
+                <a16:creationId xmlns:a16="http://schemas.microsoft.com/office/drawing/2014/main" id="{04A1A5BA-9929-8672-5A28-B1DF84BFE4AF}"/>
+              </a:ext>
+            </a:extLst>
+          </p:cNvPr>
+          <p:cNvSpPr/>
+          <p:nvPr/>
+        </p:nvSpPr>
+        <p:spPr>
+          <a:xfrm>
+            <a:off x="6920356" y="762001"/>
+            <a:ext cx="4949303" cy="3444787"/>
+          </a:xfrm>
+          <a:prstGeom prst="rect">
+            <a:avLst/>
+          </a:prstGeom>
+        </p:spPr>
+        <p:style>
+          <a:lnRef idx="2">
+            <a:schemeClr val="accent6"/>
+          </a:lnRef>
+          <a:fillRef idx="1">
+            <a:schemeClr val="lt1"/>
+          </a:fillRef>
+          <a:effectRef idx="0">
+            <a:schemeClr val="accent6"/>
+          </a:effectRef>
+          <a:fontRef idx="minor">
+            <a:schemeClr val="dk1"/>
+          </a:fontRef>
+        </p:style>
+        <p:txBody>
+          <a:bodyPr rtlCol="0" anchor="ctr"/>
+          <a:lstStyle/>
+          <a:p>
+            <a:pPr algn="ctr"/>
+            <a:endParaRPr lang="en-US"/>
+          </a:p>
+        </p:txBody>
+      </p:sp>
+      <p:pic>
+        <p:nvPicPr>
+          <p:cNvPr id="11" name="Content Placeholder 6">
+            <a:extLst>
+              <a:ext uri="{FF2B5EF4-FFF2-40B4-BE49-F238E27FC236}">
+                <a16:creationId xmlns:a16="http://schemas.microsoft.com/office/drawing/2014/main" id="{875C5400-1D5C-4357-9A4E-1DEEBE1FE7D7}"/>
+              </a:ext>
+            </a:extLst>
+          </p:cNvPr>
+          <p:cNvPicPr>
+            <a:picLocks noChangeAspect="1"/>
+          </p:cNvPicPr>
+          <p:nvPr/>
+        </p:nvPicPr>
+        <p:blipFill>
+          <a:blip r:embed="rId4">
+            <a:extLst>
+              <a:ext uri="{96DAC541-7B7A-43D3-8B79-37D633B846F1}">
+                <asvg:svgBlip xmlns:asvg="http://schemas.microsoft.com/office/drawing/2016/SVG/main" r:embed="rId5"/>
+              </a:ext>
+            </a:extLst>
+          </a:blip>
+          <a:srcRect l="2108" r="2108"/>
+          <a:stretch/>
+        </p:blipFill>
+        <p:spPr>
+          <a:xfrm>
+            <a:off x="6920356" y="762001"/>
+            <a:ext cx="4949303" cy="3444787"/>
+          </a:xfrm>
+          <a:prstGeom prst="rect">
+            <a:avLst/>
+          </a:prstGeom>
+        </p:spPr>
+      </p:pic>
+    </p:spTree>
+    <p:extLst>
+      <p:ext uri="{BB962C8B-B14F-4D97-AF65-F5344CB8AC3E}">
+        <p14:creationId xmlns:p14="http://schemas.microsoft.com/office/powerpoint/2010/main" val="4238492165"/>
+      </p:ext>
+    </p:extLst>
+  </p:cSld>
+  <p:clrMapOvr>
+    <a:masterClrMapping/>
+  </p:clrMapOvr>
+</p:sld>
+</file>
+
+<file path=ppt/slides/slide8.xml><?xml version="1.0" encoding="utf-8"?>
+<p:sld xmlns:a="http://schemas.openxmlformats.org/drawingml/2006/main" xmlns:r="http://schemas.openxmlformats.org/officeDocument/2006/relationships" xmlns:p="http://schemas.openxmlformats.org/presentationml/2006/main">
+  <p:cSld>
+    <p:spTree>
+      <p:nvGrpSpPr>
+        <p:cNvPr id="1" name=""/>
+        <p:cNvGrpSpPr/>
+        <p:nvPr/>
+      </p:nvGrpSpPr>
+      <p:grpSpPr>
+        <a:xfrm>
+          <a:off x="0" y="0"/>
+          <a:ext cx="0" cy="0"/>
+          <a:chOff x="0" y="0"/>
+          <a:chExt cx="0" cy="0"/>
+        </a:xfrm>
+      </p:grpSpPr>
+      <p:sp>
+        <p:nvSpPr>
           <p:cNvPr id="12" name="Rectangle 11">
             <a:extLst>
               <a:ext uri="{FF2B5EF4-FFF2-40B4-BE49-F238E27FC236}">
@@ -6018,7 +6766,7 @@
                   <a:schemeClr val="accent1"/>
                 </a:solidFill>
               </a:rPr>
-              <a:t>Realineamiento</a:t>
+              <a:t>Abundancia</a:t>
             </a:r>
             <a:r>
               <a:rPr lang="en-US" dirty="0">
@@ -6034,7 +6782,7 @@
                   <a:schemeClr val="accent1"/>
                 </a:solidFill>
               </a:rPr>
-              <a:t>por</a:t>
+              <a:t>diferencial</a:t>
             </a:r>
             <a:r>
               <a:rPr lang="en-US" dirty="0">
@@ -6042,7 +6790,7 @@
                   <a:schemeClr val="accent1"/>
                 </a:solidFill>
               </a:rPr>
-              <a:t> </a:t>
+              <a:t> entre </a:t>
             </a:r>
             <a:r>
               <a:rPr lang="en-US" dirty="0" err="1">
@@ -6050,7 +6798,7 @@
                   <a:schemeClr val="accent1"/>
                 </a:solidFill>
               </a:rPr>
-              <a:t>muestra</a:t>
+              <a:t>grupos</a:t>
             </a:r>
             <a:endParaRPr lang="en-US" dirty="0">
               <a:solidFill>
@@ -6060,84 +6808,6 @@
           </a:p>
         </p:txBody>
       </p:sp>
-      <p:sp>
-        <p:nvSpPr>
-          <p:cNvPr id="8" name="Rectangle 7">
-            <a:extLst>
-              <a:ext uri="{FF2B5EF4-FFF2-40B4-BE49-F238E27FC236}">
-                <a16:creationId xmlns:a16="http://schemas.microsoft.com/office/drawing/2014/main" id="{2787D638-3032-E1CC-E751-36D6043A96DA}"/>
-              </a:ext>
-            </a:extLst>
-          </p:cNvPr>
-          <p:cNvSpPr/>
-          <p:nvPr/>
-        </p:nvSpPr>
-        <p:spPr>
-          <a:xfrm>
-            <a:off x="56605" y="1549908"/>
-            <a:ext cx="6499885" cy="4283964"/>
-          </a:xfrm>
-          <a:prstGeom prst="rect">
-            <a:avLst/>
-          </a:prstGeom>
-        </p:spPr>
-        <p:style>
-          <a:lnRef idx="2">
-            <a:schemeClr val="accent6"/>
-          </a:lnRef>
-          <a:fillRef idx="1">
-            <a:schemeClr val="lt1"/>
-          </a:fillRef>
-          <a:effectRef idx="0">
-            <a:schemeClr val="accent6"/>
-          </a:effectRef>
-          <a:fontRef idx="minor">
-            <a:schemeClr val="dk1"/>
-          </a:fontRef>
-        </p:style>
-        <p:txBody>
-          <a:bodyPr rtlCol="0" anchor="ctr"/>
-          <a:lstStyle/>
-          <a:p>
-            <a:pPr algn="ctr"/>
-            <a:endParaRPr lang="en-US"/>
-          </a:p>
-        </p:txBody>
-      </p:sp>
-      <p:pic>
-        <p:nvPicPr>
-          <p:cNvPr id="7" name="Content Placeholder 6">
-            <a:extLst>
-              <a:ext uri="{FF2B5EF4-FFF2-40B4-BE49-F238E27FC236}">
-                <a16:creationId xmlns:a16="http://schemas.microsoft.com/office/drawing/2014/main" id="{6E93F1BA-1798-DF7A-57FA-2E299383A6A5}"/>
-              </a:ext>
-            </a:extLst>
-          </p:cNvPr>
-          <p:cNvPicPr>
-            <a:picLocks noGrp="1" noChangeAspect="1"/>
-          </p:cNvPicPr>
-          <p:nvPr>
-            <p:ph idx="1"/>
-          </p:nvPr>
-        </p:nvPicPr>
-        <p:blipFill rotWithShape="1">
-          <a:blip r:embed="rId2">
-            <a:extLst>
-              <a:ext uri="{96DAC541-7B7A-43D3-8B79-37D633B846F1}">
-                <asvg:svgBlip xmlns:asvg="http://schemas.microsoft.com/office/drawing/2016/SVG/main" r:embed="rId3"/>
-              </a:ext>
-            </a:extLst>
-          </a:blip>
-          <a:srcRect b="-2750"/>
-          <a:stretch/>
-        </p:blipFill>
-        <p:spPr>
-          <a:xfrm>
-            <a:off x="10886" y="1549907"/>
-            <a:ext cx="6554506" cy="4489837"/>
-          </a:xfrm>
-        </p:spPr>
-      </p:pic>
       <p:pic>
         <p:nvPicPr>
           <p:cNvPr id="10" name="Graphic 9">
@@ -6153,10 +6823,10 @@
           <p:nvPr/>
         </p:nvPicPr>
         <p:blipFill>
-          <a:blip r:embed="rId4">
+          <a:blip r:embed="rId2">
             <a:extLst>
               <a:ext uri="{96DAC541-7B7A-43D3-8B79-37D633B846F1}">
-                <asvg:svgBlip xmlns:asvg="http://schemas.microsoft.com/office/drawing/2016/SVG/main" r:embed="rId5"/>
+                <asvg:svgBlip xmlns:asvg="http://schemas.microsoft.com/office/drawing/2016/SVG/main" r:embed="rId3"/>
               </a:ext>
             </a:extLst>
           </a:blip>

</xml_diff>

<commit_message>
Creation of new LEfSe plots
</commit_message>
<xml_diff>
--- a/04_presentations/phages_amps_13062022.pptx
+++ b/04_presentations/phages_amps_13062022.pptx
@@ -11,8 +11,9 @@
     <p:sldId id="259" r:id="rId5"/>
     <p:sldId id="260" r:id="rId6"/>
     <p:sldId id="263" r:id="rId7"/>
-    <p:sldId id="262" r:id="rId8"/>
-    <p:sldId id="261" r:id="rId9"/>
+    <p:sldId id="264" r:id="rId8"/>
+    <p:sldId id="262" r:id="rId9"/>
+    <p:sldId id="261" r:id="rId10"/>
   </p:sldIdLst>
   <p:sldSz cx="12192000" cy="6858000"/>
   <p:notesSz cx="6858000" cy="9144000"/>
@@ -250,7 +251,7 @@
           <a:p>
             <a:fld id="{B30A7103-B0DC-3E4E-A435-AB5583E17E8E}" type="datetimeFigureOut">
               <a:rPr lang="en-US" smtClean="0"/>
-              <a:t>6/28/22</a:t>
+              <a:t>6/29/22</a:t>
             </a:fld>
             <a:endParaRPr lang="en-US"/>
           </a:p>
@@ -420,7 +421,7 @@
           <a:p>
             <a:fld id="{B30A7103-B0DC-3E4E-A435-AB5583E17E8E}" type="datetimeFigureOut">
               <a:rPr lang="en-US" smtClean="0"/>
-              <a:t>6/28/22</a:t>
+              <a:t>6/29/22</a:t>
             </a:fld>
             <a:endParaRPr lang="en-US"/>
           </a:p>
@@ -600,7 +601,7 @@
           <a:p>
             <a:fld id="{B30A7103-B0DC-3E4E-A435-AB5583E17E8E}" type="datetimeFigureOut">
               <a:rPr lang="en-US" smtClean="0"/>
-              <a:t>6/28/22</a:t>
+              <a:t>6/29/22</a:t>
             </a:fld>
             <a:endParaRPr lang="en-US"/>
           </a:p>
@@ -770,7 +771,7 @@
           <a:p>
             <a:fld id="{B30A7103-B0DC-3E4E-A435-AB5583E17E8E}" type="datetimeFigureOut">
               <a:rPr lang="en-US" smtClean="0"/>
-              <a:t>6/28/22</a:t>
+              <a:t>6/29/22</a:t>
             </a:fld>
             <a:endParaRPr lang="en-US"/>
           </a:p>
@@ -1016,7 +1017,7 @@
           <a:p>
             <a:fld id="{B30A7103-B0DC-3E4E-A435-AB5583E17E8E}" type="datetimeFigureOut">
               <a:rPr lang="en-US" smtClean="0"/>
-              <a:t>6/28/22</a:t>
+              <a:t>6/29/22</a:t>
             </a:fld>
             <a:endParaRPr lang="en-US"/>
           </a:p>
@@ -1248,7 +1249,7 @@
           <a:p>
             <a:fld id="{B30A7103-B0DC-3E4E-A435-AB5583E17E8E}" type="datetimeFigureOut">
               <a:rPr lang="en-US" smtClean="0"/>
-              <a:t>6/28/22</a:t>
+              <a:t>6/29/22</a:t>
             </a:fld>
             <a:endParaRPr lang="en-US"/>
           </a:p>
@@ -1615,7 +1616,7 @@
           <a:p>
             <a:fld id="{B30A7103-B0DC-3E4E-A435-AB5583E17E8E}" type="datetimeFigureOut">
               <a:rPr lang="en-US" smtClean="0"/>
-              <a:t>6/28/22</a:t>
+              <a:t>6/29/22</a:t>
             </a:fld>
             <a:endParaRPr lang="en-US"/>
           </a:p>
@@ -1733,7 +1734,7 @@
           <a:p>
             <a:fld id="{B30A7103-B0DC-3E4E-A435-AB5583E17E8E}" type="datetimeFigureOut">
               <a:rPr lang="en-US" smtClean="0"/>
-              <a:t>6/28/22</a:t>
+              <a:t>6/29/22</a:t>
             </a:fld>
             <a:endParaRPr lang="en-US"/>
           </a:p>
@@ -1828,7 +1829,7 @@
           <a:p>
             <a:fld id="{B30A7103-B0DC-3E4E-A435-AB5583E17E8E}" type="datetimeFigureOut">
               <a:rPr lang="en-US" smtClean="0"/>
-              <a:t>6/28/22</a:t>
+              <a:t>6/29/22</a:t>
             </a:fld>
             <a:endParaRPr lang="en-US"/>
           </a:p>
@@ -2105,7 +2106,7 @@
           <a:p>
             <a:fld id="{B30A7103-B0DC-3E4E-A435-AB5583E17E8E}" type="datetimeFigureOut">
               <a:rPr lang="en-US" smtClean="0"/>
-              <a:t>6/28/22</a:t>
+              <a:t>6/29/22</a:t>
             </a:fld>
             <a:endParaRPr lang="en-US"/>
           </a:p>
@@ -2362,7 +2363,7 @@
           <a:p>
             <a:fld id="{B30A7103-B0DC-3E4E-A435-AB5583E17E8E}" type="datetimeFigureOut">
               <a:rPr lang="en-US" smtClean="0"/>
-              <a:t>6/28/22</a:t>
+              <a:t>6/29/22</a:t>
             </a:fld>
             <a:endParaRPr lang="en-US"/>
           </a:p>
@@ -2575,7 +2576,7 @@
           <a:p>
             <a:fld id="{B30A7103-B0DC-3E4E-A435-AB5583E17E8E}" type="datetimeFigureOut">
               <a:rPr lang="en-US" smtClean="0"/>
-              <a:t>6/28/22</a:t>
+              <a:t>6/29/22</a:t>
             </a:fld>
             <a:endParaRPr lang="en-US"/>
           </a:p>
@@ -6345,12 +6346,8 @@
               <a:buNone/>
             </a:pPr>
             <a:r>
-              <a:rPr lang="en-US"/>
-              <a:t>70% </a:t>
-            </a:r>
-            <a:r>
               <a:rPr lang="en-US" dirty="0"/>
-              <a:t>de </a:t>
+              <a:t>70% de </a:t>
             </a:r>
             <a:r>
               <a:rPr lang="en-US" dirty="0" err="1"/>
@@ -6360,6 +6357,41 @@
           </a:p>
         </p:txBody>
       </p:sp>
+      <p:pic>
+        <p:nvPicPr>
+          <p:cNvPr id="17" name="Graphic 16">
+            <a:extLst>
+              <a:ext uri="{FF2B5EF4-FFF2-40B4-BE49-F238E27FC236}">
+                <a16:creationId xmlns:a16="http://schemas.microsoft.com/office/drawing/2014/main" id="{91848897-D21C-7099-B699-E21888F409C2}"/>
+              </a:ext>
+            </a:extLst>
+          </p:cNvPr>
+          <p:cNvPicPr>
+            <a:picLocks noChangeAspect="1"/>
+          </p:cNvPicPr>
+          <p:nvPr/>
+        </p:nvPicPr>
+        <p:blipFill rotWithShape="1">
+          <a:blip r:embed="rId6">
+            <a:extLst>
+              <a:ext uri="{96DAC541-7B7A-43D3-8B79-37D633B846F1}">
+                <asvg:svgBlip xmlns:asvg="http://schemas.microsoft.com/office/drawing/2016/SVG/main" r:embed="rId7"/>
+              </a:ext>
+            </a:extLst>
+          </a:blip>
+          <a:srcRect l="16825" t="17614" r="14217" b="17219"/>
+          <a:stretch/>
+        </p:blipFill>
+        <p:spPr>
+          <a:xfrm>
+            <a:off x="4346275" y="4245390"/>
+            <a:ext cx="3499449" cy="2480337"/>
+          </a:xfrm>
+          <a:prstGeom prst="rect">
+            <a:avLst/>
+          </a:prstGeom>
+        </p:spPr>
+      </p:pic>
     </p:spTree>
     <p:extLst>
       <p:ext uri="{BB962C8B-B14F-4D97-AF65-F5344CB8AC3E}">
@@ -6413,6 +6445,840 @@
           </a:xfrm>
         </p:spPr>
         <p:txBody>
+          <a:bodyPr/>
+          <a:lstStyle/>
+          <a:p>
+            <a:pPr algn="ctr"/>
+            <a:r>
+              <a:rPr lang="en-US" dirty="0" err="1">
+                <a:solidFill>
+                  <a:schemeClr val="accent1"/>
+                </a:solidFill>
+              </a:rPr>
+              <a:t>Abundancia</a:t>
+            </a:r>
+            <a:r>
+              <a:rPr lang="en-US" dirty="0">
+                <a:solidFill>
+                  <a:schemeClr val="accent1"/>
+                </a:solidFill>
+              </a:rPr>
+              <a:t> </a:t>
+            </a:r>
+            <a:r>
+              <a:rPr lang="en-US" dirty="0" err="1">
+                <a:solidFill>
+                  <a:schemeClr val="accent1"/>
+                </a:solidFill>
+              </a:rPr>
+              <a:t>diferencial</a:t>
+            </a:r>
+            <a:r>
+              <a:rPr lang="en-US" dirty="0">
+                <a:solidFill>
+                  <a:schemeClr val="accent1"/>
+                </a:solidFill>
+              </a:rPr>
+              <a:t> entre </a:t>
+            </a:r>
+            <a:r>
+              <a:rPr lang="en-US" dirty="0" err="1">
+                <a:solidFill>
+                  <a:schemeClr val="accent1"/>
+                </a:solidFill>
+              </a:rPr>
+              <a:t>grupos</a:t>
+            </a:r>
+            <a:endParaRPr lang="en-US" dirty="0">
+              <a:solidFill>
+                <a:schemeClr val="accent1"/>
+              </a:solidFill>
+            </a:endParaRPr>
+          </a:p>
+        </p:txBody>
+      </p:sp>
+      <p:sp>
+        <p:nvSpPr>
+          <p:cNvPr id="5" name="Content Placeholder 2">
+            <a:extLst>
+              <a:ext uri="{FF2B5EF4-FFF2-40B4-BE49-F238E27FC236}">
+                <a16:creationId xmlns:a16="http://schemas.microsoft.com/office/drawing/2014/main" id="{C1B60635-CB78-B37E-455F-C5E6CEB19988}"/>
+              </a:ext>
+            </a:extLst>
+          </p:cNvPr>
+          <p:cNvSpPr txBox="1">
+            <a:spLocks/>
+          </p:cNvSpPr>
+          <p:nvPr/>
+        </p:nvSpPr>
+        <p:spPr>
+          <a:xfrm>
+            <a:off x="756864" y="762001"/>
+            <a:ext cx="5046454" cy="468703"/>
+          </a:xfrm>
+          <a:prstGeom prst="rect">
+            <a:avLst/>
+          </a:prstGeom>
+        </p:spPr>
+        <p:txBody>
+          <a:bodyPr vert="horz" lIns="91440" tIns="45720" rIns="91440" bIns="45720" rtlCol="0" anchor="ctr">
+            <a:normAutofit lnSpcReduction="10000"/>
+          </a:bodyPr>
+          <a:lstStyle>
+            <a:lvl1pPr marL="228600" indent="-228600" algn="l" defTabSz="914400" rtl="0" eaLnBrk="1" latinLnBrk="0" hangingPunct="1">
+              <a:lnSpc>
+                <a:spcPct val="90000"/>
+              </a:lnSpc>
+              <a:spcBef>
+                <a:spcPts val="1000"/>
+              </a:spcBef>
+              <a:buFont typeface="Arial" panose="020B0604020202020204" pitchFamily="34" charset="0"/>
+              <a:buChar char="•"/>
+              <a:defRPr sz="2800" kern="1200">
+                <a:solidFill>
+                  <a:schemeClr val="tx1"/>
+                </a:solidFill>
+                <a:latin typeface="+mn-lt"/>
+                <a:ea typeface="+mn-ea"/>
+                <a:cs typeface="+mn-cs"/>
+              </a:defRPr>
+            </a:lvl1pPr>
+            <a:lvl2pPr marL="685800" indent="-228600" algn="l" defTabSz="914400" rtl="0" eaLnBrk="1" latinLnBrk="0" hangingPunct="1">
+              <a:lnSpc>
+                <a:spcPct val="90000"/>
+              </a:lnSpc>
+              <a:spcBef>
+                <a:spcPts val="500"/>
+              </a:spcBef>
+              <a:buFont typeface="Arial" panose="020B0604020202020204" pitchFamily="34" charset="0"/>
+              <a:buChar char="•"/>
+              <a:defRPr sz="2400" kern="1200">
+                <a:solidFill>
+                  <a:schemeClr val="tx1"/>
+                </a:solidFill>
+                <a:latin typeface="+mn-lt"/>
+                <a:ea typeface="+mn-ea"/>
+                <a:cs typeface="+mn-cs"/>
+              </a:defRPr>
+            </a:lvl2pPr>
+            <a:lvl3pPr marL="1143000" indent="-228600" algn="l" defTabSz="914400" rtl="0" eaLnBrk="1" latinLnBrk="0" hangingPunct="1">
+              <a:lnSpc>
+                <a:spcPct val="90000"/>
+              </a:lnSpc>
+              <a:spcBef>
+                <a:spcPts val="500"/>
+              </a:spcBef>
+              <a:buFont typeface="Arial" panose="020B0604020202020204" pitchFamily="34" charset="0"/>
+              <a:buChar char="•"/>
+              <a:defRPr sz="2000" kern="1200">
+                <a:solidFill>
+                  <a:schemeClr val="tx1"/>
+                </a:solidFill>
+                <a:latin typeface="+mn-lt"/>
+                <a:ea typeface="+mn-ea"/>
+                <a:cs typeface="+mn-cs"/>
+              </a:defRPr>
+            </a:lvl3pPr>
+            <a:lvl4pPr marL="1600200" indent="-228600" algn="l" defTabSz="914400" rtl="0" eaLnBrk="1" latinLnBrk="0" hangingPunct="1">
+              <a:lnSpc>
+                <a:spcPct val="90000"/>
+              </a:lnSpc>
+              <a:spcBef>
+                <a:spcPts val="500"/>
+              </a:spcBef>
+              <a:buFont typeface="Arial" panose="020B0604020202020204" pitchFamily="34" charset="0"/>
+              <a:buChar char="•"/>
+              <a:defRPr sz="1800" kern="1200">
+                <a:solidFill>
+                  <a:schemeClr val="tx1"/>
+                </a:solidFill>
+                <a:latin typeface="+mn-lt"/>
+                <a:ea typeface="+mn-ea"/>
+                <a:cs typeface="+mn-cs"/>
+              </a:defRPr>
+            </a:lvl4pPr>
+            <a:lvl5pPr marL="2057400" indent="-228600" algn="l" defTabSz="914400" rtl="0" eaLnBrk="1" latinLnBrk="0" hangingPunct="1">
+              <a:lnSpc>
+                <a:spcPct val="90000"/>
+              </a:lnSpc>
+              <a:spcBef>
+                <a:spcPts val="500"/>
+              </a:spcBef>
+              <a:buFont typeface="Arial" panose="020B0604020202020204" pitchFamily="34" charset="0"/>
+              <a:buChar char="•"/>
+              <a:defRPr sz="1800" kern="1200">
+                <a:solidFill>
+                  <a:schemeClr val="tx1"/>
+                </a:solidFill>
+                <a:latin typeface="+mn-lt"/>
+                <a:ea typeface="+mn-ea"/>
+                <a:cs typeface="+mn-cs"/>
+              </a:defRPr>
+            </a:lvl5pPr>
+            <a:lvl6pPr marL="2514600" indent="-228600" algn="l" defTabSz="914400" rtl="0" eaLnBrk="1" latinLnBrk="0" hangingPunct="1">
+              <a:lnSpc>
+                <a:spcPct val="90000"/>
+              </a:lnSpc>
+              <a:spcBef>
+                <a:spcPts val="500"/>
+              </a:spcBef>
+              <a:buFont typeface="Arial" panose="020B0604020202020204" pitchFamily="34" charset="0"/>
+              <a:buChar char="•"/>
+              <a:defRPr sz="1800" kern="1200">
+                <a:solidFill>
+                  <a:schemeClr val="tx1"/>
+                </a:solidFill>
+                <a:latin typeface="+mn-lt"/>
+                <a:ea typeface="+mn-ea"/>
+                <a:cs typeface="+mn-cs"/>
+              </a:defRPr>
+            </a:lvl6pPr>
+            <a:lvl7pPr marL="2971800" indent="-228600" algn="l" defTabSz="914400" rtl="0" eaLnBrk="1" latinLnBrk="0" hangingPunct="1">
+              <a:lnSpc>
+                <a:spcPct val="90000"/>
+              </a:lnSpc>
+              <a:spcBef>
+                <a:spcPts val="500"/>
+              </a:spcBef>
+              <a:buFont typeface="Arial" panose="020B0604020202020204" pitchFamily="34" charset="0"/>
+              <a:buChar char="•"/>
+              <a:defRPr sz="1800" kern="1200">
+                <a:solidFill>
+                  <a:schemeClr val="tx1"/>
+                </a:solidFill>
+                <a:latin typeface="+mn-lt"/>
+                <a:ea typeface="+mn-ea"/>
+                <a:cs typeface="+mn-cs"/>
+              </a:defRPr>
+            </a:lvl7pPr>
+            <a:lvl8pPr marL="3429000" indent="-228600" algn="l" defTabSz="914400" rtl="0" eaLnBrk="1" latinLnBrk="0" hangingPunct="1">
+              <a:lnSpc>
+                <a:spcPct val="90000"/>
+              </a:lnSpc>
+              <a:spcBef>
+                <a:spcPts val="500"/>
+              </a:spcBef>
+              <a:buFont typeface="Arial" panose="020B0604020202020204" pitchFamily="34" charset="0"/>
+              <a:buChar char="•"/>
+              <a:defRPr sz="1800" kern="1200">
+                <a:solidFill>
+                  <a:schemeClr val="tx1"/>
+                </a:solidFill>
+                <a:latin typeface="+mn-lt"/>
+                <a:ea typeface="+mn-ea"/>
+                <a:cs typeface="+mn-cs"/>
+              </a:defRPr>
+            </a:lvl8pPr>
+            <a:lvl9pPr marL="3886200" indent="-228600" algn="l" defTabSz="914400" rtl="0" eaLnBrk="1" latinLnBrk="0" hangingPunct="1">
+              <a:lnSpc>
+                <a:spcPct val="90000"/>
+              </a:lnSpc>
+              <a:spcBef>
+                <a:spcPts val="500"/>
+              </a:spcBef>
+              <a:buFont typeface="Arial" panose="020B0604020202020204" pitchFamily="34" charset="0"/>
+              <a:buChar char="•"/>
+              <a:defRPr sz="1800" kern="1200">
+                <a:solidFill>
+                  <a:schemeClr val="tx1"/>
+                </a:solidFill>
+                <a:latin typeface="+mn-lt"/>
+                <a:ea typeface="+mn-ea"/>
+                <a:cs typeface="+mn-cs"/>
+              </a:defRPr>
+            </a:lvl9pPr>
+          </a:lstStyle>
+          <a:p>
+            <a:pPr marL="0" indent="0" algn="ctr">
+              <a:buNone/>
+            </a:pPr>
+            <a:r>
+              <a:rPr lang="en-US" dirty="0"/>
+              <a:t>75% de </a:t>
+            </a:r>
+            <a:r>
+              <a:rPr lang="en-US" dirty="0" err="1"/>
+              <a:t>cobertura</a:t>
+            </a:r>
+            <a:endParaRPr lang="en-US" dirty="0"/>
+          </a:p>
+        </p:txBody>
+      </p:sp>
+      <p:sp>
+        <p:nvSpPr>
+          <p:cNvPr id="6" name="Content Placeholder 2">
+            <a:extLst>
+              <a:ext uri="{FF2B5EF4-FFF2-40B4-BE49-F238E27FC236}">
+                <a16:creationId xmlns:a16="http://schemas.microsoft.com/office/drawing/2014/main" id="{BE79D40B-03E7-D7E2-8AD9-435AB9F3C912}"/>
+              </a:ext>
+            </a:extLst>
+          </p:cNvPr>
+          <p:cNvSpPr txBox="1">
+            <a:spLocks/>
+          </p:cNvSpPr>
+          <p:nvPr/>
+        </p:nvSpPr>
+        <p:spPr>
+          <a:xfrm>
+            <a:off x="7134660" y="762001"/>
+            <a:ext cx="5046454" cy="468703"/>
+          </a:xfrm>
+          <a:prstGeom prst="rect">
+            <a:avLst/>
+          </a:prstGeom>
+        </p:spPr>
+        <p:txBody>
+          <a:bodyPr vert="horz" lIns="91440" tIns="45720" rIns="91440" bIns="45720" rtlCol="0" anchor="ctr">
+            <a:normAutofit lnSpcReduction="10000"/>
+          </a:bodyPr>
+          <a:lstStyle>
+            <a:lvl1pPr marL="228600" indent="-228600" algn="l" defTabSz="914400" rtl="0" eaLnBrk="1" latinLnBrk="0" hangingPunct="1">
+              <a:lnSpc>
+                <a:spcPct val="90000"/>
+              </a:lnSpc>
+              <a:spcBef>
+                <a:spcPts val="1000"/>
+              </a:spcBef>
+              <a:buFont typeface="Arial" panose="020B0604020202020204" pitchFamily="34" charset="0"/>
+              <a:buChar char="•"/>
+              <a:defRPr sz="2800" kern="1200">
+                <a:solidFill>
+                  <a:schemeClr val="tx1"/>
+                </a:solidFill>
+                <a:latin typeface="+mn-lt"/>
+                <a:ea typeface="+mn-ea"/>
+                <a:cs typeface="+mn-cs"/>
+              </a:defRPr>
+            </a:lvl1pPr>
+            <a:lvl2pPr marL="685800" indent="-228600" algn="l" defTabSz="914400" rtl="0" eaLnBrk="1" latinLnBrk="0" hangingPunct="1">
+              <a:lnSpc>
+                <a:spcPct val="90000"/>
+              </a:lnSpc>
+              <a:spcBef>
+                <a:spcPts val="500"/>
+              </a:spcBef>
+              <a:buFont typeface="Arial" panose="020B0604020202020204" pitchFamily="34" charset="0"/>
+              <a:buChar char="•"/>
+              <a:defRPr sz="2400" kern="1200">
+                <a:solidFill>
+                  <a:schemeClr val="tx1"/>
+                </a:solidFill>
+                <a:latin typeface="+mn-lt"/>
+                <a:ea typeface="+mn-ea"/>
+                <a:cs typeface="+mn-cs"/>
+              </a:defRPr>
+            </a:lvl2pPr>
+            <a:lvl3pPr marL="1143000" indent="-228600" algn="l" defTabSz="914400" rtl="0" eaLnBrk="1" latinLnBrk="0" hangingPunct="1">
+              <a:lnSpc>
+                <a:spcPct val="90000"/>
+              </a:lnSpc>
+              <a:spcBef>
+                <a:spcPts val="500"/>
+              </a:spcBef>
+              <a:buFont typeface="Arial" panose="020B0604020202020204" pitchFamily="34" charset="0"/>
+              <a:buChar char="•"/>
+              <a:defRPr sz="2000" kern="1200">
+                <a:solidFill>
+                  <a:schemeClr val="tx1"/>
+                </a:solidFill>
+                <a:latin typeface="+mn-lt"/>
+                <a:ea typeface="+mn-ea"/>
+                <a:cs typeface="+mn-cs"/>
+              </a:defRPr>
+            </a:lvl3pPr>
+            <a:lvl4pPr marL="1600200" indent="-228600" algn="l" defTabSz="914400" rtl="0" eaLnBrk="1" latinLnBrk="0" hangingPunct="1">
+              <a:lnSpc>
+                <a:spcPct val="90000"/>
+              </a:lnSpc>
+              <a:spcBef>
+                <a:spcPts val="500"/>
+              </a:spcBef>
+              <a:buFont typeface="Arial" panose="020B0604020202020204" pitchFamily="34" charset="0"/>
+              <a:buChar char="•"/>
+              <a:defRPr sz="1800" kern="1200">
+                <a:solidFill>
+                  <a:schemeClr val="tx1"/>
+                </a:solidFill>
+                <a:latin typeface="+mn-lt"/>
+                <a:ea typeface="+mn-ea"/>
+                <a:cs typeface="+mn-cs"/>
+              </a:defRPr>
+            </a:lvl4pPr>
+            <a:lvl5pPr marL="2057400" indent="-228600" algn="l" defTabSz="914400" rtl="0" eaLnBrk="1" latinLnBrk="0" hangingPunct="1">
+              <a:lnSpc>
+                <a:spcPct val="90000"/>
+              </a:lnSpc>
+              <a:spcBef>
+                <a:spcPts val="500"/>
+              </a:spcBef>
+              <a:buFont typeface="Arial" panose="020B0604020202020204" pitchFamily="34" charset="0"/>
+              <a:buChar char="•"/>
+              <a:defRPr sz="1800" kern="1200">
+                <a:solidFill>
+                  <a:schemeClr val="tx1"/>
+                </a:solidFill>
+                <a:latin typeface="+mn-lt"/>
+                <a:ea typeface="+mn-ea"/>
+                <a:cs typeface="+mn-cs"/>
+              </a:defRPr>
+            </a:lvl5pPr>
+            <a:lvl6pPr marL="2514600" indent="-228600" algn="l" defTabSz="914400" rtl="0" eaLnBrk="1" latinLnBrk="0" hangingPunct="1">
+              <a:lnSpc>
+                <a:spcPct val="90000"/>
+              </a:lnSpc>
+              <a:spcBef>
+                <a:spcPts val="500"/>
+              </a:spcBef>
+              <a:buFont typeface="Arial" panose="020B0604020202020204" pitchFamily="34" charset="0"/>
+              <a:buChar char="•"/>
+              <a:defRPr sz="1800" kern="1200">
+                <a:solidFill>
+                  <a:schemeClr val="tx1"/>
+                </a:solidFill>
+                <a:latin typeface="+mn-lt"/>
+                <a:ea typeface="+mn-ea"/>
+                <a:cs typeface="+mn-cs"/>
+              </a:defRPr>
+            </a:lvl6pPr>
+            <a:lvl7pPr marL="2971800" indent="-228600" algn="l" defTabSz="914400" rtl="0" eaLnBrk="1" latinLnBrk="0" hangingPunct="1">
+              <a:lnSpc>
+                <a:spcPct val="90000"/>
+              </a:lnSpc>
+              <a:spcBef>
+                <a:spcPts val="500"/>
+              </a:spcBef>
+              <a:buFont typeface="Arial" panose="020B0604020202020204" pitchFamily="34" charset="0"/>
+              <a:buChar char="•"/>
+              <a:defRPr sz="1800" kern="1200">
+                <a:solidFill>
+                  <a:schemeClr val="tx1"/>
+                </a:solidFill>
+                <a:latin typeface="+mn-lt"/>
+                <a:ea typeface="+mn-ea"/>
+                <a:cs typeface="+mn-cs"/>
+              </a:defRPr>
+            </a:lvl7pPr>
+            <a:lvl8pPr marL="3429000" indent="-228600" algn="l" defTabSz="914400" rtl="0" eaLnBrk="1" latinLnBrk="0" hangingPunct="1">
+              <a:lnSpc>
+                <a:spcPct val="90000"/>
+              </a:lnSpc>
+              <a:spcBef>
+                <a:spcPts val="500"/>
+              </a:spcBef>
+              <a:buFont typeface="Arial" panose="020B0604020202020204" pitchFamily="34" charset="0"/>
+              <a:buChar char="•"/>
+              <a:defRPr sz="1800" kern="1200">
+                <a:solidFill>
+                  <a:schemeClr val="tx1"/>
+                </a:solidFill>
+                <a:latin typeface="+mn-lt"/>
+                <a:ea typeface="+mn-ea"/>
+                <a:cs typeface="+mn-cs"/>
+              </a:defRPr>
+            </a:lvl8pPr>
+            <a:lvl9pPr marL="3886200" indent="-228600" algn="l" defTabSz="914400" rtl="0" eaLnBrk="1" latinLnBrk="0" hangingPunct="1">
+              <a:lnSpc>
+                <a:spcPct val="90000"/>
+              </a:lnSpc>
+              <a:spcBef>
+                <a:spcPts val="500"/>
+              </a:spcBef>
+              <a:buFont typeface="Arial" panose="020B0604020202020204" pitchFamily="34" charset="0"/>
+              <a:buChar char="•"/>
+              <a:defRPr sz="1800" kern="1200">
+                <a:solidFill>
+                  <a:schemeClr val="tx1"/>
+                </a:solidFill>
+                <a:latin typeface="+mn-lt"/>
+                <a:ea typeface="+mn-ea"/>
+                <a:cs typeface="+mn-cs"/>
+              </a:defRPr>
+            </a:lvl9pPr>
+          </a:lstStyle>
+          <a:p>
+            <a:pPr marL="0" indent="0" algn="ctr">
+              <a:buNone/>
+            </a:pPr>
+            <a:r>
+              <a:rPr lang="en-US" dirty="0"/>
+              <a:t>70% de </a:t>
+            </a:r>
+            <a:r>
+              <a:rPr lang="en-US" dirty="0" err="1"/>
+              <a:t>cobertura</a:t>
+            </a:r>
+            <a:endParaRPr lang="en-US" dirty="0"/>
+          </a:p>
+        </p:txBody>
+      </p:sp>
+      <p:pic>
+        <p:nvPicPr>
+          <p:cNvPr id="4" name="Graphic 3">
+            <a:extLst>
+              <a:ext uri="{FF2B5EF4-FFF2-40B4-BE49-F238E27FC236}">
+                <a16:creationId xmlns:a16="http://schemas.microsoft.com/office/drawing/2014/main" id="{767373C5-D8AF-B40A-8089-67D7064FDDF9}"/>
+              </a:ext>
+            </a:extLst>
+          </p:cNvPr>
+          <p:cNvPicPr>
+            <a:picLocks noChangeAspect="1"/>
+          </p:cNvPicPr>
+          <p:nvPr/>
+        </p:nvPicPr>
+        <p:blipFill rotWithShape="1">
+          <a:blip r:embed="rId2">
+            <a:extLst>
+              <a:ext uri="{96DAC541-7B7A-43D3-8B79-37D633B846F1}">
+                <asvg:svgBlip xmlns:asvg="http://schemas.microsoft.com/office/drawing/2016/SVG/main" r:embed="rId3"/>
+              </a:ext>
+            </a:extLst>
+          </a:blip>
+          <a:srcRect l="16711" t="11298" r="12264" b="2406"/>
+          <a:stretch/>
+        </p:blipFill>
+        <p:spPr>
+          <a:xfrm>
+            <a:off x="1965691" y="1230957"/>
+            <a:ext cx="2632187" cy="2119400"/>
+          </a:xfrm>
+          <a:prstGeom prst="rect">
+            <a:avLst/>
+          </a:prstGeom>
+        </p:spPr>
+      </p:pic>
+      <p:pic>
+        <p:nvPicPr>
+          <p:cNvPr id="11" name="Graphic 10">
+            <a:extLst>
+              <a:ext uri="{FF2B5EF4-FFF2-40B4-BE49-F238E27FC236}">
+                <a16:creationId xmlns:a16="http://schemas.microsoft.com/office/drawing/2014/main" id="{4EBB3787-0995-BEC1-0135-4F87693D67B6}"/>
+              </a:ext>
+            </a:extLst>
+          </p:cNvPr>
+          <p:cNvPicPr>
+            <a:picLocks noChangeAspect="1"/>
+          </p:cNvPicPr>
+          <p:nvPr/>
+        </p:nvPicPr>
+        <p:blipFill rotWithShape="1">
+          <a:blip r:embed="rId4">
+            <a:extLst>
+              <a:ext uri="{96DAC541-7B7A-43D3-8B79-37D633B846F1}">
+                <asvg:svgBlip xmlns:asvg="http://schemas.microsoft.com/office/drawing/2016/SVG/main" r:embed="rId5"/>
+              </a:ext>
+            </a:extLst>
+          </a:blip>
+          <a:srcRect l="19518" t="21985" r="11663" b="6545"/>
+          <a:stretch/>
+        </p:blipFill>
+        <p:spPr>
+          <a:xfrm>
+            <a:off x="1604478" y="3429000"/>
+            <a:ext cx="3351226" cy="1367287"/>
+          </a:xfrm>
+          <a:prstGeom prst="rect">
+            <a:avLst/>
+          </a:prstGeom>
+        </p:spPr>
+      </p:pic>
+      <p:pic>
+        <p:nvPicPr>
+          <p:cNvPr id="14" name="Graphic 13">
+            <a:extLst>
+              <a:ext uri="{FF2B5EF4-FFF2-40B4-BE49-F238E27FC236}">
+                <a16:creationId xmlns:a16="http://schemas.microsoft.com/office/drawing/2014/main" id="{D262A247-5DD8-9EE7-4FC6-A3D2A7047FC3}"/>
+              </a:ext>
+            </a:extLst>
+          </p:cNvPr>
+          <p:cNvPicPr>
+            <a:picLocks noChangeAspect="1"/>
+          </p:cNvPicPr>
+          <p:nvPr/>
+        </p:nvPicPr>
+        <p:blipFill rotWithShape="1">
+          <a:blip r:embed="rId6">
+            <a:extLst>
+              <a:ext uri="{96DAC541-7B7A-43D3-8B79-37D633B846F1}">
+                <asvg:svgBlip xmlns:asvg="http://schemas.microsoft.com/office/drawing/2016/SVG/main" r:embed="rId7"/>
+              </a:ext>
+            </a:extLst>
+          </a:blip>
+          <a:srcRect l="20206" t="18101" r="10657" b="4641"/>
+          <a:stretch/>
+        </p:blipFill>
+        <p:spPr>
+          <a:xfrm>
+            <a:off x="1767746" y="4874930"/>
+            <a:ext cx="3024689" cy="1757031"/>
+          </a:xfrm>
+          <a:prstGeom prst="rect">
+            <a:avLst/>
+          </a:prstGeom>
+        </p:spPr>
+      </p:pic>
+      <p:pic>
+        <p:nvPicPr>
+          <p:cNvPr id="16" name="Graphic 15">
+            <a:extLst>
+              <a:ext uri="{FF2B5EF4-FFF2-40B4-BE49-F238E27FC236}">
+                <a16:creationId xmlns:a16="http://schemas.microsoft.com/office/drawing/2014/main" id="{C07F1B76-70F0-AB12-CD49-2E2E2F38193B}"/>
+              </a:ext>
+            </a:extLst>
+          </p:cNvPr>
+          <p:cNvPicPr>
+            <a:picLocks noChangeAspect="1"/>
+          </p:cNvPicPr>
+          <p:nvPr/>
+        </p:nvPicPr>
+        <p:blipFill rotWithShape="1">
+          <a:blip r:embed="rId8">
+            <a:extLst>
+              <a:ext uri="{96DAC541-7B7A-43D3-8B79-37D633B846F1}">
+                <asvg:svgBlip xmlns:asvg="http://schemas.microsoft.com/office/drawing/2016/SVG/main" r:embed="rId9"/>
+              </a:ext>
+            </a:extLst>
+          </a:blip>
+          <a:srcRect l="15118" t="12109" r="11832" b="3901"/>
+          <a:stretch/>
+        </p:blipFill>
+        <p:spPr>
+          <a:xfrm>
+            <a:off x="8215757" y="1172187"/>
+            <a:ext cx="2884253" cy="2197647"/>
+          </a:xfrm>
+          <a:prstGeom prst="rect">
+            <a:avLst/>
+          </a:prstGeom>
+        </p:spPr>
+      </p:pic>
+      <p:pic>
+        <p:nvPicPr>
+          <p:cNvPr id="18" name="Graphic 17">
+            <a:extLst>
+              <a:ext uri="{FF2B5EF4-FFF2-40B4-BE49-F238E27FC236}">
+                <a16:creationId xmlns:a16="http://schemas.microsoft.com/office/drawing/2014/main" id="{61F79DD6-D5EC-EE5E-85D6-6BB354A20CFA}"/>
+              </a:ext>
+            </a:extLst>
+          </p:cNvPr>
+          <p:cNvPicPr>
+            <a:picLocks noChangeAspect="1"/>
+          </p:cNvPicPr>
+          <p:nvPr/>
+        </p:nvPicPr>
+        <p:blipFill rotWithShape="1">
+          <a:blip r:embed="rId10">
+            <a:extLst>
+              <a:ext uri="{96DAC541-7B7A-43D3-8B79-37D633B846F1}">
+                <asvg:svgBlip xmlns:asvg="http://schemas.microsoft.com/office/drawing/2016/SVG/main" r:embed="rId11"/>
+              </a:ext>
+            </a:extLst>
+          </a:blip>
+          <a:srcRect l="19668" t="20999" r="9172" b="5817"/>
+          <a:stretch/>
+        </p:blipFill>
+        <p:spPr>
+          <a:xfrm>
+            <a:off x="8215757" y="3488166"/>
+            <a:ext cx="2884253" cy="1165353"/>
+          </a:xfrm>
+          <a:prstGeom prst="rect">
+            <a:avLst/>
+          </a:prstGeom>
+        </p:spPr>
+      </p:pic>
+      <p:pic>
+        <p:nvPicPr>
+          <p:cNvPr id="20" name="Graphic 19">
+            <a:extLst>
+              <a:ext uri="{FF2B5EF4-FFF2-40B4-BE49-F238E27FC236}">
+                <a16:creationId xmlns:a16="http://schemas.microsoft.com/office/drawing/2014/main" id="{BFCABB99-0D25-E9DB-F577-1E8A8A514515}"/>
+              </a:ext>
+            </a:extLst>
+          </p:cNvPr>
+          <p:cNvPicPr>
+            <a:picLocks noChangeAspect="1"/>
+          </p:cNvPicPr>
+          <p:nvPr/>
+        </p:nvPicPr>
+        <p:blipFill rotWithShape="1">
+          <a:blip r:embed="rId12">
+            <a:extLst>
+              <a:ext uri="{96DAC541-7B7A-43D3-8B79-37D633B846F1}">
+                <asvg:svgBlip xmlns:asvg="http://schemas.microsoft.com/office/drawing/2016/SVG/main" r:embed="rId13"/>
+              </a:ext>
+            </a:extLst>
+          </a:blip>
+          <a:srcRect l="20283" t="17484" r="9223" b="4581"/>
+          <a:stretch/>
+        </p:blipFill>
+        <p:spPr>
+          <a:xfrm>
+            <a:off x="8030797" y="4796287"/>
+            <a:ext cx="3254175" cy="1870238"/>
+          </a:xfrm>
+          <a:prstGeom prst="rect">
+            <a:avLst/>
+          </a:prstGeom>
+        </p:spPr>
+      </p:pic>
+      <p:pic>
+        <p:nvPicPr>
+          <p:cNvPr id="22" name="Graphic 21">
+            <a:extLst>
+              <a:ext uri="{FF2B5EF4-FFF2-40B4-BE49-F238E27FC236}">
+                <a16:creationId xmlns:a16="http://schemas.microsoft.com/office/drawing/2014/main" id="{6ED5AD4C-A214-0E0C-E638-4972DA9E4124}"/>
+              </a:ext>
+            </a:extLst>
+          </p:cNvPr>
+          <p:cNvPicPr>
+            <a:picLocks noChangeAspect="1"/>
+          </p:cNvPicPr>
+          <p:nvPr/>
+        </p:nvPicPr>
+        <p:blipFill rotWithShape="1">
+          <a:blip r:embed="rId14">
+            <a:extLst>
+              <a:ext uri="{96DAC541-7B7A-43D3-8B79-37D633B846F1}">
+                <asvg:svgBlip xmlns:asvg="http://schemas.microsoft.com/office/drawing/2016/SVG/main" r:embed="rId15"/>
+              </a:ext>
+            </a:extLst>
+          </a:blip>
+          <a:srcRect l="16881" t="16999" r="14086" b="16999"/>
+          <a:stretch/>
+        </p:blipFill>
+        <p:spPr>
+          <a:xfrm>
+            <a:off x="5203673" y="1193227"/>
+            <a:ext cx="2510203" cy="1800000"/>
+          </a:xfrm>
+          <a:prstGeom prst="rect">
+            <a:avLst/>
+          </a:prstGeom>
+        </p:spPr>
+      </p:pic>
+      <p:pic>
+        <p:nvPicPr>
+          <p:cNvPr id="25" name="Graphic 24">
+            <a:extLst>
+              <a:ext uri="{FF2B5EF4-FFF2-40B4-BE49-F238E27FC236}">
+                <a16:creationId xmlns:a16="http://schemas.microsoft.com/office/drawing/2014/main" id="{341062E9-8F01-7482-B39F-1EE206B8542A}"/>
+              </a:ext>
+            </a:extLst>
+          </p:cNvPr>
+          <p:cNvPicPr>
+            <a:picLocks noChangeAspect="1"/>
+          </p:cNvPicPr>
+          <p:nvPr/>
+        </p:nvPicPr>
+        <p:blipFill rotWithShape="1">
+          <a:blip r:embed="rId16">
+            <a:extLst>
+              <a:ext uri="{96DAC541-7B7A-43D3-8B79-37D633B846F1}">
+                <asvg:svgBlip xmlns:asvg="http://schemas.microsoft.com/office/drawing/2016/SVG/main" r:embed="rId17"/>
+              </a:ext>
+            </a:extLst>
+          </a:blip>
+          <a:srcRect l="17537" t="18344" r="14628" b="17270"/>
+          <a:stretch/>
+        </p:blipFill>
+        <p:spPr>
+          <a:xfrm>
+            <a:off x="5203673" y="3074930"/>
+            <a:ext cx="2528560" cy="1800000"/>
+          </a:xfrm>
+          <a:prstGeom prst="rect">
+            <a:avLst/>
+          </a:prstGeom>
+        </p:spPr>
+      </p:pic>
+      <p:pic>
+        <p:nvPicPr>
+          <p:cNvPr id="30" name="Graphic 29">
+            <a:extLst>
+              <a:ext uri="{FF2B5EF4-FFF2-40B4-BE49-F238E27FC236}">
+                <a16:creationId xmlns:a16="http://schemas.microsoft.com/office/drawing/2014/main" id="{5FB517C3-20CE-2828-5D2A-20F2A11FE3E1}"/>
+              </a:ext>
+            </a:extLst>
+          </p:cNvPr>
+          <p:cNvPicPr>
+            <a:picLocks noChangeAspect="1"/>
+          </p:cNvPicPr>
+          <p:nvPr/>
+        </p:nvPicPr>
+        <p:blipFill rotWithShape="1">
+          <a:blip r:embed="rId18">
+            <a:extLst>
+              <a:ext uri="{96DAC541-7B7A-43D3-8B79-37D633B846F1}">
+                <asvg:svgBlip xmlns:asvg="http://schemas.microsoft.com/office/drawing/2016/SVG/main" r:embed="rId19"/>
+              </a:ext>
+            </a:extLst>
+          </a:blip>
+          <a:srcRect l="16881" t="17219" r="14086" b="16999"/>
+          <a:stretch/>
+        </p:blipFill>
+        <p:spPr>
+          <a:xfrm>
+            <a:off x="5213641" y="4956633"/>
+            <a:ext cx="2518592" cy="1800000"/>
+          </a:xfrm>
+          <a:prstGeom prst="rect">
+            <a:avLst/>
+          </a:prstGeom>
+        </p:spPr>
+      </p:pic>
+    </p:spTree>
+    <p:extLst>
+      <p:ext uri="{BB962C8B-B14F-4D97-AF65-F5344CB8AC3E}">
+        <p14:creationId xmlns:p14="http://schemas.microsoft.com/office/powerpoint/2010/main" val="1102445859"/>
+      </p:ext>
+    </p:extLst>
+  </p:cSld>
+  <p:clrMapOvr>
+    <a:masterClrMapping/>
+  </p:clrMapOvr>
+</p:sld>
+</file>
+
+<file path=ppt/slides/slide8.xml><?xml version="1.0" encoding="utf-8"?>
+<p:sld xmlns:a="http://schemas.openxmlformats.org/drawingml/2006/main" xmlns:r="http://schemas.openxmlformats.org/officeDocument/2006/relationships" xmlns:p="http://schemas.openxmlformats.org/presentationml/2006/main">
+  <p:cSld>
+    <p:spTree>
+      <p:nvGrpSpPr>
+        <p:cNvPr id="1" name=""/>
+        <p:cNvGrpSpPr/>
+        <p:nvPr/>
+      </p:nvGrpSpPr>
+      <p:grpSpPr>
+        <a:xfrm>
+          <a:off x="0" y="0"/>
+          <a:ext cx="0" cy="0"/>
+          <a:chOff x="0" y="0"/>
+          <a:chExt cx="0" cy="0"/>
+        </a:xfrm>
+      </p:grpSpPr>
+      <p:sp>
+        <p:nvSpPr>
+          <p:cNvPr id="2" name="Title 1">
+            <a:extLst>
+              <a:ext uri="{FF2B5EF4-FFF2-40B4-BE49-F238E27FC236}">
+                <a16:creationId xmlns:a16="http://schemas.microsoft.com/office/drawing/2014/main" id="{E19511CC-B123-44DF-9D1E-265F7DF5F1BC}"/>
+              </a:ext>
+            </a:extLst>
+          </p:cNvPr>
+          <p:cNvSpPr>
+            <a:spLocks noGrp="1"/>
+          </p:cNvSpPr>
+          <p:nvPr>
+            <p:ph type="title"/>
+          </p:nvPr>
+        </p:nvSpPr>
+        <p:spPr>
+          <a:xfrm>
+            <a:off x="10886" y="1"/>
+            <a:ext cx="12181114" cy="762000"/>
+          </a:xfrm>
+        </p:spPr>
+        <p:txBody>
           <a:bodyPr>
             <a:normAutofit fontScale="90000"/>
           </a:bodyPr>
@@ -6516,8 +7382,8 @@
         </p:nvSpPr>
         <p:spPr>
           <a:xfrm>
-            <a:off x="393035" y="762001"/>
-            <a:ext cx="4949303" cy="3444787"/>
+            <a:off x="1022764" y="762002"/>
+            <a:ext cx="4230723" cy="2912852"/>
           </a:xfrm>
           <a:prstGeom prst="rect">
             <a:avLst/>
@@ -6575,8 +7441,8 @@
         </p:blipFill>
         <p:spPr>
           <a:xfrm>
-            <a:off x="393035" y="762001"/>
-            <a:ext cx="4949303" cy="3444787"/>
+            <a:off x="1022764" y="762001"/>
+            <a:ext cx="4230723" cy="2944645"/>
           </a:xfrm>
         </p:spPr>
       </p:pic>
@@ -6594,8 +7460,8 @@
         </p:nvSpPr>
         <p:spPr>
           <a:xfrm>
-            <a:off x="6920356" y="762001"/>
-            <a:ext cx="4949303" cy="3444787"/>
+            <a:off x="6938515" y="762001"/>
+            <a:ext cx="4230723" cy="2944645"/>
           </a:xfrm>
           <a:prstGeom prst="rect">
             <a:avLst/>
@@ -6651,8 +7517,166 @@
         </p:blipFill>
         <p:spPr>
           <a:xfrm>
-            <a:off x="6920356" y="762001"/>
-            <a:ext cx="4949303" cy="3444787"/>
+            <a:off x="6938515" y="621102"/>
+            <a:ext cx="4433159" cy="3085544"/>
+          </a:xfrm>
+          <a:prstGeom prst="rect">
+            <a:avLst/>
+          </a:prstGeom>
+        </p:spPr>
+      </p:pic>
+      <p:sp>
+        <p:nvSpPr>
+          <p:cNvPr id="15" name="Rectangle 14">
+            <a:extLst>
+              <a:ext uri="{FF2B5EF4-FFF2-40B4-BE49-F238E27FC236}">
+                <a16:creationId xmlns:a16="http://schemas.microsoft.com/office/drawing/2014/main" id="{25A64714-49B0-C078-8E3E-2D4ADAF81A05}"/>
+              </a:ext>
+            </a:extLst>
+          </p:cNvPr>
+          <p:cNvSpPr/>
+          <p:nvPr/>
+        </p:nvSpPr>
+        <p:spPr>
+          <a:xfrm>
+            <a:off x="1022764" y="3795624"/>
+            <a:ext cx="4230723" cy="2912852"/>
+          </a:xfrm>
+          <a:prstGeom prst="rect">
+            <a:avLst/>
+          </a:prstGeom>
+        </p:spPr>
+        <p:style>
+          <a:lnRef idx="2">
+            <a:schemeClr val="accent6"/>
+          </a:lnRef>
+          <a:fillRef idx="1">
+            <a:schemeClr val="lt1"/>
+          </a:fillRef>
+          <a:effectRef idx="0">
+            <a:schemeClr val="accent6"/>
+          </a:effectRef>
+          <a:fontRef idx="minor">
+            <a:schemeClr val="dk1"/>
+          </a:fontRef>
+        </p:style>
+        <p:txBody>
+          <a:bodyPr rtlCol="0" anchor="ctr"/>
+          <a:lstStyle/>
+          <a:p>
+            <a:pPr algn="ctr"/>
+            <a:endParaRPr lang="en-US"/>
+          </a:p>
+        </p:txBody>
+      </p:sp>
+      <p:pic>
+        <p:nvPicPr>
+          <p:cNvPr id="16" name="Content Placeholder 6">
+            <a:extLst>
+              <a:ext uri="{FF2B5EF4-FFF2-40B4-BE49-F238E27FC236}">
+                <a16:creationId xmlns:a16="http://schemas.microsoft.com/office/drawing/2014/main" id="{E1EF4BBA-9B7C-125A-F33E-26F143962BE9}"/>
+              </a:ext>
+            </a:extLst>
+          </p:cNvPr>
+          <p:cNvPicPr>
+            <a:picLocks noChangeAspect="1"/>
+          </p:cNvPicPr>
+          <p:nvPr/>
+        </p:nvPicPr>
+        <p:blipFill>
+          <a:blip r:embed="rId6">
+            <a:extLst>
+              <a:ext uri="{96DAC541-7B7A-43D3-8B79-37D633B846F1}">
+                <asvg:svgBlip xmlns:asvg="http://schemas.microsoft.com/office/drawing/2016/SVG/main" r:embed="rId7"/>
+              </a:ext>
+            </a:extLst>
+          </a:blip>
+          <a:srcRect l="2108" r="2108"/>
+          <a:stretch/>
+        </p:blipFill>
+        <p:spPr>
+          <a:xfrm>
+            <a:off x="1022764" y="3795623"/>
+            <a:ext cx="4230723" cy="2944645"/>
+          </a:xfrm>
+          <a:prstGeom prst="rect">
+            <a:avLst/>
+          </a:prstGeom>
+        </p:spPr>
+      </p:pic>
+      <p:sp>
+        <p:nvSpPr>
+          <p:cNvPr id="17" name="Rectangle 16">
+            <a:extLst>
+              <a:ext uri="{FF2B5EF4-FFF2-40B4-BE49-F238E27FC236}">
+                <a16:creationId xmlns:a16="http://schemas.microsoft.com/office/drawing/2014/main" id="{4F39E955-9109-0C25-58F7-1FEBD5822B17}"/>
+              </a:ext>
+            </a:extLst>
+          </p:cNvPr>
+          <p:cNvSpPr/>
+          <p:nvPr/>
+        </p:nvSpPr>
+        <p:spPr>
+          <a:xfrm>
+            <a:off x="6938515" y="3795623"/>
+            <a:ext cx="4230723" cy="2944645"/>
+          </a:xfrm>
+          <a:prstGeom prst="rect">
+            <a:avLst/>
+          </a:prstGeom>
+        </p:spPr>
+        <p:style>
+          <a:lnRef idx="2">
+            <a:schemeClr val="accent6"/>
+          </a:lnRef>
+          <a:fillRef idx="1">
+            <a:schemeClr val="lt1"/>
+          </a:fillRef>
+          <a:effectRef idx="0">
+            <a:schemeClr val="accent6"/>
+          </a:effectRef>
+          <a:fontRef idx="minor">
+            <a:schemeClr val="dk1"/>
+          </a:fontRef>
+        </p:style>
+        <p:txBody>
+          <a:bodyPr rtlCol="0" anchor="ctr"/>
+          <a:lstStyle/>
+          <a:p>
+            <a:pPr algn="ctr"/>
+            <a:endParaRPr lang="en-US"/>
+          </a:p>
+        </p:txBody>
+      </p:sp>
+      <p:pic>
+        <p:nvPicPr>
+          <p:cNvPr id="18" name="Content Placeholder 6">
+            <a:extLst>
+              <a:ext uri="{FF2B5EF4-FFF2-40B4-BE49-F238E27FC236}">
+                <a16:creationId xmlns:a16="http://schemas.microsoft.com/office/drawing/2014/main" id="{C8C363DF-1106-CC75-837A-B8DFD1CD398B}"/>
+              </a:ext>
+            </a:extLst>
+          </p:cNvPr>
+          <p:cNvPicPr>
+            <a:picLocks noChangeAspect="1"/>
+          </p:cNvPicPr>
+          <p:nvPr/>
+        </p:nvPicPr>
+        <p:blipFill>
+          <a:blip r:embed="rId8">
+            <a:extLst>
+              <a:ext uri="{96DAC541-7B7A-43D3-8B79-37D633B846F1}">
+                <asvg:svgBlip xmlns:asvg="http://schemas.microsoft.com/office/drawing/2016/SVG/main" r:embed="rId9"/>
+              </a:ext>
+            </a:extLst>
+          </a:blip>
+          <a:srcRect l="2108" r="2108"/>
+          <a:stretch/>
+        </p:blipFill>
+        <p:spPr>
+          <a:xfrm>
+            <a:off x="6938515" y="3795623"/>
+            <a:ext cx="4230723" cy="2944645"/>
           </a:xfrm>
           <a:prstGeom prst="rect">
             <a:avLst/>
@@ -6672,7 +7696,7 @@
 </p:sld>
 </file>
 
-<file path=ppt/slides/slide8.xml><?xml version="1.0" encoding="utf-8"?>
+<file path=ppt/slides/slide9.xml><?xml version="1.0" encoding="utf-8"?>
 <p:sld xmlns:a="http://schemas.openxmlformats.org/drawingml/2006/main" xmlns:r="http://schemas.openxmlformats.org/officeDocument/2006/relationships" xmlns:p="http://schemas.openxmlformats.org/presentationml/2006/main">
   <p:cSld>
     <p:spTree>
@@ -6691,50 +7715,6 @@
       </p:grpSpPr>
       <p:sp>
         <p:nvSpPr>
-          <p:cNvPr id="12" name="Rectangle 11">
-            <a:extLst>
-              <a:ext uri="{FF2B5EF4-FFF2-40B4-BE49-F238E27FC236}">
-                <a16:creationId xmlns:a16="http://schemas.microsoft.com/office/drawing/2014/main" id="{DD7C5354-7395-3AE4-23F2-C9EF39AEED62}"/>
-              </a:ext>
-            </a:extLst>
-          </p:cNvPr>
-          <p:cNvSpPr/>
-          <p:nvPr/>
-        </p:nvSpPr>
-        <p:spPr>
-          <a:xfrm>
-            <a:off x="7533132" y="1625600"/>
-            <a:ext cx="3581400" cy="3758184"/>
-          </a:xfrm>
-          <a:prstGeom prst="rect">
-            <a:avLst/>
-          </a:prstGeom>
-        </p:spPr>
-        <p:style>
-          <a:lnRef idx="2">
-            <a:schemeClr val="accent6"/>
-          </a:lnRef>
-          <a:fillRef idx="1">
-            <a:schemeClr val="lt1"/>
-          </a:fillRef>
-          <a:effectRef idx="0">
-            <a:schemeClr val="accent6"/>
-          </a:effectRef>
-          <a:fontRef idx="minor">
-            <a:schemeClr val="dk1"/>
-          </a:fontRef>
-        </p:style>
-        <p:txBody>
-          <a:bodyPr rtlCol="0" anchor="ctr"/>
-          <a:lstStyle/>
-          <a:p>
-            <a:pPr algn="ctr"/>
-            <a:endParaRPr lang="en-US"/>
-          </a:p>
-        </p:txBody>
-      </p:sp>
-      <p:sp>
-        <p:nvSpPr>
           <p:cNvPr id="2" name="Title 1">
             <a:extLst>
               <a:ext uri="{FF2B5EF4-FFF2-40B4-BE49-F238E27FC236}">
@@ -6766,7 +7746,7 @@
                   <a:schemeClr val="accent1"/>
                 </a:solidFill>
               </a:rPr>
-              <a:t>Abundancia</a:t>
+              <a:t>Anotacion</a:t>
             </a:r>
             <a:r>
               <a:rPr lang="en-US" dirty="0">
@@ -6774,7 +7754,7 @@
                   <a:schemeClr val="accent1"/>
                 </a:solidFill>
               </a:rPr>
-              <a:t> </a:t>
+              <a:t> de </a:t>
             </a:r>
             <a:r>
               <a:rPr lang="en-US" dirty="0" err="1">
@@ -6782,7 +7762,7 @@
                   <a:schemeClr val="accent1"/>
                 </a:solidFill>
               </a:rPr>
-              <a:t>diferencial</a:t>
+              <a:t>potenciales</a:t>
             </a:r>
             <a:r>
               <a:rPr lang="en-US" dirty="0">
@@ -6790,30 +7770,17 @@
                   <a:schemeClr val="accent1"/>
                 </a:solidFill>
               </a:rPr>
-              <a:t> entre </a:t>
-            </a:r>
-            <a:r>
-              <a:rPr lang="en-US" dirty="0" err="1">
-                <a:solidFill>
-                  <a:schemeClr val="accent1"/>
-                </a:solidFill>
-              </a:rPr>
-              <a:t>grupos</a:t>
-            </a:r>
-            <a:endParaRPr lang="en-US" dirty="0">
-              <a:solidFill>
-                <a:schemeClr val="accent1"/>
-              </a:solidFill>
-            </a:endParaRPr>
+              <a:t> AMPs</a:t>
+            </a:r>
           </a:p>
         </p:txBody>
       </p:sp>
       <p:pic>
         <p:nvPicPr>
-          <p:cNvPr id="10" name="Graphic 9">
+          <p:cNvPr id="4" name="Picture 3" descr="Diagram&#10;&#10;Description automatically generated">
             <a:extLst>
               <a:ext uri="{FF2B5EF4-FFF2-40B4-BE49-F238E27FC236}">
-                <a16:creationId xmlns:a16="http://schemas.microsoft.com/office/drawing/2014/main" id="{7F2B1EE8-85FC-C825-B7A5-F92BE80D478E}"/>
+                <a16:creationId xmlns:a16="http://schemas.microsoft.com/office/drawing/2014/main" id="{5D1D4026-EAE2-DBD7-67F5-3312B1A78008}"/>
               </a:ext>
             </a:extLst>
           </p:cNvPr>
@@ -6823,21 +7790,15 @@
           <p:nvPr/>
         </p:nvPicPr>
         <p:blipFill>
-          <a:blip r:embed="rId2">
-            <a:extLst>
-              <a:ext uri="{96DAC541-7B7A-43D3-8B79-37D633B846F1}">
-                <asvg:svgBlip xmlns:asvg="http://schemas.microsoft.com/office/drawing/2016/SVG/main" r:embed="rId3"/>
-              </a:ext>
-            </a:extLst>
-          </a:blip>
+          <a:blip r:embed="rId2"/>
           <a:stretch>
             <a:fillRect/>
           </a:stretch>
         </p:blipFill>
         <p:spPr>
           <a:xfrm>
-            <a:off x="7533132" y="1701292"/>
-            <a:ext cx="3581400" cy="3606800"/>
+            <a:off x="1083669" y="1138984"/>
+            <a:ext cx="10024661" cy="4580032"/>
           </a:xfrm>
           <a:prstGeom prst="rect">
             <a:avLst/>

</xml_diff>